<commit_message>
Wednesday updates and changes
</commit_message>
<xml_diff>
--- a/Project.pptx
+++ b/Project.pptx
@@ -11,13 +11,13 @@
     <p:sldId id="272" r:id="rId5"/>
     <p:sldId id="261" r:id="rId6"/>
     <p:sldId id="263" r:id="rId7"/>
-    <p:sldId id="262" r:id="rId8"/>
-    <p:sldId id="267" r:id="rId9"/>
-    <p:sldId id="270" r:id="rId10"/>
-    <p:sldId id="264" r:id="rId11"/>
-    <p:sldId id="268" r:id="rId12"/>
-    <p:sldId id="269" r:id="rId13"/>
-    <p:sldId id="271" r:id="rId14"/>
+    <p:sldId id="267" r:id="rId8"/>
+    <p:sldId id="270" r:id="rId9"/>
+    <p:sldId id="264" r:id="rId10"/>
+    <p:sldId id="268" r:id="rId11"/>
+    <p:sldId id="269" r:id="rId12"/>
+    <p:sldId id="271" r:id="rId13"/>
+    <p:sldId id="262" r:id="rId14"/>
     <p:sldId id="266" r:id="rId15"/>
     <p:sldId id="265" r:id="rId16"/>
   </p:sldIdLst>
@@ -246,7 +246,7 @@
           <p:nvPr/>
         </p:nvPicPr>
         <mc:AlternateContent xmlns:mc="http://schemas.openxmlformats.org/markup-compatibility/2006">
-          <mc:Choice xmlns:ma="http://schemas.microsoft.com/office/mac/drawingml/2008/main" xmlns:mv="urn:schemas-microsoft-com:mac:vml" xmlns="" Requires="ma">
+          <mc:Choice xmlns="" xmlns:mv="urn:schemas-microsoft-com:mac:vml" xmlns:ma="http://schemas.microsoft.com/office/mac/drawingml/2008/main" Requires="ma">
             <p:blipFill>
               <a:blip r:embed="rId3"/>
               <a:stretch>
@@ -282,7 +282,7 @@
           <p:nvPr/>
         </p:nvPicPr>
         <mc:AlternateContent xmlns:mc="http://schemas.openxmlformats.org/markup-compatibility/2006">
-          <mc:Choice xmlns:ma="http://schemas.microsoft.com/office/mac/drawingml/2008/main" xmlns:mv="urn:schemas-microsoft-com:mac:vml" xmlns="" Requires="ma">
+          <mc:Choice xmlns="" xmlns:mv="urn:schemas-microsoft-com:mac:vml" xmlns:ma="http://schemas.microsoft.com/office/mac/drawingml/2008/main" Requires="ma">
             <p:blipFill>
               <a:blip r:embed="rId7"/>
               <a:stretch>
@@ -318,7 +318,7 @@
           <p:nvPr/>
         </p:nvPicPr>
         <mc:AlternateContent xmlns:mc="http://schemas.openxmlformats.org/markup-compatibility/2006">
-          <mc:Choice xmlns:ma="http://schemas.microsoft.com/office/mac/drawingml/2008/main" xmlns:mv="urn:schemas-microsoft-com:mac:vml" xmlns="" Requires="ma">
+          <mc:Choice xmlns="" xmlns:mv="urn:schemas-microsoft-com:mac:vml" xmlns:ma="http://schemas.microsoft.com/office/mac/drawingml/2008/main" Requires="ma">
             <p:blipFill>
               <a:blip r:embed="rId9"/>
               <a:stretch>
@@ -726,7 +726,7 @@
           <p:nvPr/>
         </p:nvPicPr>
         <mc:AlternateContent xmlns:mc="http://schemas.openxmlformats.org/markup-compatibility/2006">
-          <mc:Choice xmlns:ma="http://schemas.microsoft.com/office/mac/drawingml/2008/main" xmlns:mv="urn:schemas-microsoft-com:mac:vml" xmlns="" Requires="ma">
+          <mc:Choice xmlns="" xmlns:mv="urn:schemas-microsoft-com:mac:vml" xmlns:ma="http://schemas.microsoft.com/office/mac/drawingml/2008/main" Requires="ma">
             <p:blipFill>
               <a:blip r:embed="rId3"/>
               <a:stretch>
@@ -762,7 +762,7 @@
           <p:nvPr/>
         </p:nvPicPr>
         <mc:AlternateContent xmlns:mc="http://schemas.openxmlformats.org/markup-compatibility/2006">
-          <mc:Choice xmlns:ma="http://schemas.microsoft.com/office/mac/drawingml/2008/main" xmlns:mv="urn:schemas-microsoft-com:mac:vml" xmlns="" Requires="ma">
+          <mc:Choice xmlns="" xmlns:mv="urn:schemas-microsoft-com:mac:vml" xmlns:ma="http://schemas.microsoft.com/office/mac/drawingml/2008/main" Requires="ma">
             <p:blipFill>
               <a:blip r:embed="rId9"/>
               <a:stretch>
@@ -798,7 +798,7 @@
           <p:nvPr/>
         </p:nvPicPr>
         <mc:AlternateContent xmlns:mc="http://schemas.openxmlformats.org/markup-compatibility/2006">
-          <mc:Choice xmlns:ma="http://schemas.microsoft.com/office/mac/drawingml/2008/main" xmlns:mv="urn:schemas-microsoft-com:mac:vml" xmlns="" Requires="ma">
+          <mc:Choice xmlns="" xmlns:mv="urn:schemas-microsoft-com:mac:vml" xmlns:ma="http://schemas.microsoft.com/office/mac/drawingml/2008/main" Requires="ma">
             <p:blipFill>
               <a:blip r:embed="rId11"/>
               <a:stretch>
@@ -1476,285 +1476,6 @@
       </p:sp>
       <p:pic>
         <p:nvPicPr>
-          <p:cNvPr id="4098" name="Picture 2"/>
-          <p:cNvPicPr>
-            <a:picLocks noChangeAspect="1" noChangeArrowheads="1"/>
-          </p:cNvPicPr>
-          <p:nvPr/>
-        </p:nvPicPr>
-        <p:blipFill>
-          <a:blip r:embed="rId2">
-            <a:extLst>
-              <a:ext uri="{28A0092B-C50C-407E-A947-70E740481C1C}">
-                <a14:useLocalDpi xmlns:a14="http://schemas.microsoft.com/office/drawing/2010/main" val="0"/>
-              </a:ext>
-            </a:extLst>
-          </a:blip>
-          <a:srcRect/>
-          <a:stretch>
-            <a:fillRect/>
-          </a:stretch>
-        </p:blipFill>
-        <p:spPr bwMode="auto">
-          <a:xfrm>
-            <a:off x="4872038" y="1528762"/>
-            <a:ext cx="3700461" cy="2994896"/>
-          </a:xfrm>
-          <a:prstGeom prst="rect">
-            <a:avLst/>
-          </a:prstGeom>
-          <a:noFill/>
-          <a:ln>
-            <a:noFill/>
-          </a:ln>
-          <a:extLst>
-            <a:ext uri="{909E8E84-426E-40DD-AFC4-6F175D3DCCD1}">
-              <a14:hiddenFill xmlns:a14="http://schemas.microsoft.com/office/drawing/2010/main">
-                <a:solidFill>
-                  <a:schemeClr val="accent1"/>
-                </a:solidFill>
-              </a14:hiddenFill>
-            </a:ext>
-            <a:ext uri="{91240B29-F687-4F45-9708-019B960494DF}">
-              <a14:hiddenLine xmlns:a14="http://schemas.microsoft.com/office/drawing/2010/main" w="9525">
-                <a:solidFill>
-                  <a:schemeClr val="tx1"/>
-                </a:solidFill>
-                <a:miter lim="800000"/>
-                <a:headEnd/>
-                <a:tailEnd/>
-              </a14:hiddenLine>
-            </a:ext>
-          </a:extLst>
-        </p:spPr>
-      </p:pic>
-      <p:sp>
-        <p:nvSpPr>
-          <p:cNvPr id="3" name="TextBox 2"/>
-          <p:cNvSpPr txBox="1"/>
-          <p:nvPr/>
-        </p:nvSpPr>
-        <p:spPr>
-          <a:xfrm>
-            <a:off x="4872038" y="4867275"/>
-            <a:ext cx="3005137" cy="369332"/>
-          </a:xfrm>
-          <a:prstGeom prst="rect">
-            <a:avLst/>
-          </a:prstGeom>
-          <a:noFill/>
-        </p:spPr>
-        <p:txBody>
-          <a:bodyPr wrap="square" rtlCol="0">
-            <a:spAutoFit/>
-          </a:bodyPr>
-          <a:lstStyle/>
-          <a:p>
-            <a:r>
-              <a:rPr lang="en-US" dirty="0" smtClean="0"/>
-              <a:t>Frame: 3306 (34 Matches)</a:t>
-            </a:r>
-            <a:endParaRPr lang="en-US" dirty="0"/>
-          </a:p>
-        </p:txBody>
-      </p:sp>
-      <p:pic>
-        <p:nvPicPr>
-          <p:cNvPr id="4099" name="Picture 3"/>
-          <p:cNvPicPr>
-            <a:picLocks noChangeAspect="1" noChangeArrowheads="1"/>
-          </p:cNvPicPr>
-          <p:nvPr/>
-        </p:nvPicPr>
-        <p:blipFill>
-          <a:blip r:embed="rId3">
-            <a:extLst>
-              <a:ext uri="{28A0092B-C50C-407E-A947-70E740481C1C}">
-                <a14:useLocalDpi xmlns:a14="http://schemas.microsoft.com/office/drawing/2010/main" val="0"/>
-              </a:ext>
-            </a:extLst>
-          </a:blip>
-          <a:srcRect/>
-          <a:stretch>
-            <a:fillRect/>
-          </a:stretch>
-        </p:blipFill>
-        <p:spPr bwMode="auto">
-          <a:xfrm>
-            <a:off x="476249" y="1509712"/>
-            <a:ext cx="4095749" cy="3776223"/>
-          </a:xfrm>
-          <a:prstGeom prst="rect">
-            <a:avLst/>
-          </a:prstGeom>
-          <a:noFill/>
-          <a:ln>
-            <a:noFill/>
-          </a:ln>
-          <a:extLst>
-            <a:ext uri="{909E8E84-426E-40DD-AFC4-6F175D3DCCD1}">
-              <a14:hiddenFill xmlns:a14="http://schemas.microsoft.com/office/drawing/2010/main">
-                <a:solidFill>
-                  <a:schemeClr val="accent1"/>
-                </a:solidFill>
-              </a14:hiddenFill>
-            </a:ext>
-            <a:ext uri="{91240B29-F687-4F45-9708-019B960494DF}">
-              <a14:hiddenLine xmlns:a14="http://schemas.microsoft.com/office/drawing/2010/main" w="9525">
-                <a:solidFill>
-                  <a:schemeClr val="tx1"/>
-                </a:solidFill>
-                <a:miter lim="800000"/>
-                <a:headEnd/>
-                <a:tailEnd/>
-              </a14:hiddenLine>
-            </a:ext>
-          </a:extLst>
-        </p:spPr>
-      </p:pic>
-    </p:spTree>
-    <p:extLst>
-      <p:ext uri="{BB962C8B-B14F-4D97-AF65-F5344CB8AC3E}">
-        <p14:creationId xmlns:p14="http://schemas.microsoft.com/office/powerpoint/2010/main" val="819379470"/>
-      </p:ext>
-    </p:extLst>
-  </p:cSld>
-  <p:clrMapOvr>
-    <a:masterClrMapping/>
-  </p:clrMapOvr>
-</p:sld>
-</file>
-
-<file path=ppt/slides/slide11.xml><?xml version="1.0" encoding="utf-8"?>
-<p:sld xmlns:a="http://schemas.openxmlformats.org/drawingml/2006/main" xmlns:r="http://schemas.openxmlformats.org/officeDocument/2006/relationships" xmlns:p="http://schemas.openxmlformats.org/presentationml/2006/main">
-  <p:cSld>
-    <p:spTree>
-      <p:nvGrpSpPr>
-        <p:cNvPr id="1" name=""/>
-        <p:cNvGrpSpPr/>
-        <p:nvPr/>
-      </p:nvGrpSpPr>
-      <p:grpSpPr>
-        <a:xfrm>
-          <a:off x="0" y="0"/>
-          <a:ext cx="0" cy="0"/>
-          <a:chOff x="0" y="0"/>
-          <a:chExt cx="0" cy="0"/>
-        </a:xfrm>
-      </p:grpSpPr>
-      <p:sp>
-        <p:nvSpPr>
-          <p:cNvPr id="2" name="Title 1"/>
-          <p:cNvSpPr txBox="1">
-            <a:spLocks/>
-          </p:cNvSpPr>
-          <p:nvPr/>
-        </p:nvSpPr>
-        <p:spPr>
-          <a:xfrm>
-            <a:off x="7350" y="5294"/>
-            <a:ext cx="9129299" cy="1432982"/>
-          </a:xfrm>
-          <a:prstGeom prst="rect">
-            <a:avLst/>
-          </a:prstGeom>
-        </p:spPr>
-        <p:txBody>
-          <a:bodyPr vert="horz" lIns="91440" tIns="45720" rIns="91440" bIns="45720" rtlCol="0" anchor="ctr">
-            <a:normAutofit/>
-          </a:bodyPr>
-          <a:lstStyle/>
-          <a:p>
-            <a:pPr lvl="0">
-              <a:spcBef>
-                <a:spcPct val="0"/>
-              </a:spcBef>
-              <a:defRPr/>
-            </a:pPr>
-            <a:r>
-              <a:rPr lang="en-US" sz="3200" b="1" dirty="0" smtClean="0">
-                <a:solidFill>
-                  <a:srgbClr val="990000"/>
-                </a:solidFill>
-                <a:latin typeface="Arial"/>
-                <a:ea typeface="+mj-ea"/>
-                <a:cs typeface="Arial"/>
-              </a:rPr>
-              <a:t>VIDEO INDEXING</a:t>
-            </a:r>
-            <a:r>
-              <a:rPr kumimoji="0" lang="en-US" sz="4400" u="none" strike="noStrike" kern="1200" cap="none" spc="0" normalizeH="0" baseline="0" noProof="0" dirty="0" smtClean="0">
-                <a:ln>
-                  <a:noFill/>
-                </a:ln>
-                <a:solidFill>
-                  <a:srgbClr val="990000"/>
-                </a:solidFill>
-                <a:effectLst/>
-                <a:uLnTx/>
-                <a:uFillTx/>
-                <a:latin typeface="Arial"/>
-                <a:ea typeface="+mj-ea"/>
-                <a:cs typeface="Arial"/>
-              </a:rPr>
-              <a:t/>
-            </a:r>
-            <a:br>
-              <a:rPr kumimoji="0" lang="en-US" sz="4400" u="none" strike="noStrike" kern="1200" cap="none" spc="0" normalizeH="0" baseline="0" noProof="0" dirty="0" smtClean="0">
-                <a:ln>
-                  <a:noFill/>
-                </a:ln>
-                <a:solidFill>
-                  <a:srgbClr val="990000"/>
-                </a:solidFill>
-                <a:effectLst/>
-                <a:uLnTx/>
-                <a:uFillTx/>
-                <a:latin typeface="Arial"/>
-                <a:ea typeface="+mj-ea"/>
-                <a:cs typeface="Arial"/>
-              </a:rPr>
-            </a:br>
-            <a:r>
-              <a:rPr lang="en-US" sz="1400" dirty="0">
-                <a:solidFill>
-                  <a:srgbClr val="990000"/>
-                </a:solidFill>
-                <a:latin typeface="Arial"/>
-                <a:cs typeface="Arial"/>
-              </a:rPr>
-              <a:t>Results </a:t>
-            </a:r>
-            <a:r>
-              <a:rPr lang="en-US" sz="1400" dirty="0" smtClean="0">
-                <a:solidFill>
-                  <a:srgbClr val="990000"/>
-                </a:solidFill>
-                <a:latin typeface="Arial"/>
-                <a:ea typeface="+mj-ea"/>
-                <a:cs typeface="Arial"/>
-              </a:rPr>
-              <a:t>Alin_Day1_002\16700.png</a:t>
-            </a:r>
-            <a:endParaRPr kumimoji="0" lang="en-US" sz="1400" u="none" strike="noStrike" kern="1200" cap="none" spc="0" normalizeH="0" baseline="0" noProof="0" dirty="0" smtClean="0">
-              <a:ln>
-                <a:noFill/>
-              </a:ln>
-              <a:solidFill>
-                <a:srgbClr val="990000"/>
-              </a:solidFill>
-              <a:effectLst/>
-              <a:uLnTx/>
-              <a:uFillTx/>
-              <a:latin typeface="Arial"/>
-              <a:ea typeface="+mj-ea"/>
-              <a:cs typeface="Arial"/>
-            </a:endParaRPr>
-          </a:p>
-        </p:txBody>
-      </p:sp>
-      <p:pic>
-        <p:nvPicPr>
           <p:cNvPr id="1026" name="Picture 2"/>
           <p:cNvPicPr>
             <a:picLocks noChangeAspect="1" noChangeArrowheads="1"/>
@@ -1901,10 +1622,17 @@
   <p:clrMapOvr>
     <a:masterClrMapping/>
   </p:clrMapOvr>
+  <p:timing>
+    <p:tnLst>
+      <p:par>
+        <p:cTn id="1" dur="indefinite" restart="never" nodeType="tmRoot"/>
+      </p:par>
+    </p:tnLst>
+  </p:timing>
 </p:sld>
 </file>
 
-<file path=ppt/slides/slide12.xml><?xml version="1.0" encoding="utf-8"?>
+<file path=ppt/slides/slide11.xml><?xml version="1.0" encoding="utf-8"?>
 <p:sld xmlns:a="http://schemas.openxmlformats.org/drawingml/2006/main" xmlns:r="http://schemas.openxmlformats.org/officeDocument/2006/relationships" xmlns:p="http://schemas.openxmlformats.org/presentationml/2006/main">
   <p:cSld>
     <p:spTree>
@@ -2180,6 +1908,496 @@
   <p:clrMapOvr>
     <a:masterClrMapping/>
   </p:clrMapOvr>
+  <p:timing>
+    <p:tnLst>
+      <p:par>
+        <p:cTn id="1" dur="indefinite" restart="never" nodeType="tmRoot"/>
+      </p:par>
+    </p:tnLst>
+  </p:timing>
+</p:sld>
+</file>
+
+<file path=ppt/slides/slide12.xml><?xml version="1.0" encoding="utf-8"?>
+<p:sld xmlns:a="http://schemas.openxmlformats.org/drawingml/2006/main" xmlns:r="http://schemas.openxmlformats.org/officeDocument/2006/relationships" xmlns:p="http://schemas.openxmlformats.org/presentationml/2006/main">
+  <p:cSld>
+    <p:spTree>
+      <p:nvGrpSpPr>
+        <p:cNvPr id="1" name=""/>
+        <p:cNvGrpSpPr/>
+        <p:nvPr/>
+      </p:nvGrpSpPr>
+      <p:grpSpPr>
+        <a:xfrm>
+          <a:off x="0" y="0"/>
+          <a:ext cx="0" cy="0"/>
+          <a:chOff x="0" y="0"/>
+          <a:chExt cx="0" cy="0"/>
+        </a:xfrm>
+      </p:grpSpPr>
+      <p:pic>
+        <p:nvPicPr>
+          <p:cNvPr id="7171" name="Picture 3"/>
+          <p:cNvPicPr>
+            <a:picLocks noChangeAspect="1" noChangeArrowheads="1"/>
+          </p:cNvPicPr>
+          <p:nvPr/>
+        </p:nvPicPr>
+        <p:blipFill>
+          <a:blip r:embed="rId2">
+            <a:extLst>
+              <a:ext uri="{28A0092B-C50C-407E-A947-70E740481C1C}">
+                <a14:useLocalDpi xmlns:a14="http://schemas.microsoft.com/office/drawing/2010/main" val="0"/>
+              </a:ext>
+            </a:extLst>
+          </a:blip>
+          <a:srcRect/>
+          <a:stretch>
+            <a:fillRect/>
+          </a:stretch>
+        </p:blipFill>
+        <p:spPr bwMode="auto">
+          <a:xfrm>
+            <a:off x="6195699" y="1438276"/>
+            <a:ext cx="2570001" cy="2369505"/>
+          </a:xfrm>
+          <a:prstGeom prst="rect">
+            <a:avLst/>
+          </a:prstGeom>
+          <a:noFill/>
+          <a:ln>
+            <a:noFill/>
+          </a:ln>
+          <a:extLst>
+            <a:ext uri="{909E8E84-426E-40DD-AFC4-6F175D3DCCD1}">
+              <a14:hiddenFill xmlns:a14="http://schemas.microsoft.com/office/drawing/2010/main">
+                <a:solidFill>
+                  <a:schemeClr val="accent1"/>
+                </a:solidFill>
+              </a14:hiddenFill>
+            </a:ext>
+            <a:ext uri="{91240B29-F687-4F45-9708-019B960494DF}">
+              <a14:hiddenLine xmlns:a14="http://schemas.microsoft.com/office/drawing/2010/main" w="9525">
+                <a:solidFill>
+                  <a:schemeClr val="tx1"/>
+                </a:solidFill>
+                <a:miter lim="800000"/>
+                <a:headEnd/>
+                <a:tailEnd/>
+              </a14:hiddenLine>
+            </a:ext>
+          </a:extLst>
+        </p:spPr>
+      </p:pic>
+      <p:sp>
+        <p:nvSpPr>
+          <p:cNvPr id="2" name="Title 1"/>
+          <p:cNvSpPr txBox="1">
+            <a:spLocks/>
+          </p:cNvSpPr>
+          <p:nvPr/>
+        </p:nvSpPr>
+        <p:spPr>
+          <a:xfrm>
+            <a:off x="7350" y="5294"/>
+            <a:ext cx="9129299" cy="1432982"/>
+          </a:xfrm>
+          <a:prstGeom prst="rect">
+            <a:avLst/>
+          </a:prstGeom>
+        </p:spPr>
+        <p:txBody>
+          <a:bodyPr vert="horz" lIns="91440" tIns="45720" rIns="91440" bIns="45720" rtlCol="0" anchor="ctr">
+            <a:normAutofit/>
+          </a:bodyPr>
+          <a:lstStyle/>
+          <a:p>
+            <a:pPr lvl="0">
+              <a:spcBef>
+                <a:spcPct val="0"/>
+              </a:spcBef>
+              <a:defRPr/>
+            </a:pPr>
+            <a:r>
+              <a:rPr lang="en-US" sz="3200" b="1" dirty="0">
+                <a:solidFill>
+                  <a:srgbClr val="990000"/>
+                </a:solidFill>
+                <a:latin typeface="Arial"/>
+                <a:cs typeface="Arial"/>
+              </a:rPr>
+              <a:t>VIDEO CORRECTIONS</a:t>
+            </a:r>
+            <a:r>
+              <a:rPr lang="en-US" sz="4400" dirty="0">
+                <a:solidFill>
+                  <a:srgbClr val="990000"/>
+                </a:solidFill>
+                <a:latin typeface="Arial"/>
+                <a:cs typeface="Arial"/>
+              </a:rPr>
+              <a:t/>
+            </a:r>
+            <a:br>
+              <a:rPr lang="en-US" sz="4400" dirty="0">
+                <a:solidFill>
+                  <a:srgbClr val="990000"/>
+                </a:solidFill>
+                <a:latin typeface="Arial"/>
+                <a:cs typeface="Arial"/>
+              </a:rPr>
+            </a:br>
+            <a:r>
+              <a:rPr lang="en-US" sz="1400" dirty="0" smtClean="0">
+                <a:solidFill>
+                  <a:srgbClr val="990000"/>
+                </a:solidFill>
+                <a:latin typeface="Arial"/>
+                <a:cs typeface="Arial"/>
+              </a:rPr>
+              <a:t>Attempt </a:t>
+            </a:r>
+            <a:r>
+              <a:rPr kumimoji="0" lang="en-US" sz="1400" u="none" strike="noStrike" kern="1200" cap="none" spc="0" normalizeH="0" baseline="0" noProof="0" dirty="0" smtClean="0">
+                <a:ln>
+                  <a:noFill/>
+                </a:ln>
+                <a:solidFill>
+                  <a:srgbClr val="990000"/>
+                </a:solidFill>
+                <a:effectLst/>
+                <a:uLnTx/>
+                <a:uFillTx/>
+                <a:latin typeface="Arial"/>
+                <a:ea typeface="+mj-ea"/>
+                <a:cs typeface="Arial"/>
+              </a:rPr>
+              <a:t>Motion </a:t>
+            </a:r>
+            <a:r>
+              <a:rPr kumimoji="0" lang="en-US" sz="1400" u="none" strike="noStrike" kern="1200" cap="none" spc="0" normalizeH="0" baseline="0" noProof="0" dirty="0" smtClean="0">
+                <a:ln>
+                  <a:noFill/>
+                </a:ln>
+                <a:solidFill>
+                  <a:srgbClr val="990000"/>
+                </a:solidFill>
+                <a:effectLst/>
+                <a:uLnTx/>
+                <a:uFillTx/>
+                <a:latin typeface="Arial"/>
+                <a:ea typeface="+mj-ea"/>
+                <a:cs typeface="Arial"/>
+              </a:rPr>
+              <a:t>Stabilization</a:t>
+            </a:r>
+          </a:p>
+        </p:txBody>
+      </p:sp>
+      <mc:AlternateContent xmlns:mc="http://schemas.openxmlformats.org/markup-compatibility/2006">
+        <mc:Choice xmlns:a14="http://schemas.microsoft.com/office/drawing/2010/main" Requires="a14">
+          <p:sp>
+            <p:nvSpPr>
+              <p:cNvPr id="3" name="TextBox 2"/>
+              <p:cNvSpPr txBox="1"/>
+              <p:nvPr/>
+            </p:nvSpPr>
+            <p:spPr>
+              <a:xfrm>
+                <a:off x="323849" y="1257300"/>
+                <a:ext cx="6307687" cy="3808863"/>
+              </a:xfrm>
+              <a:prstGeom prst="rect">
+                <a:avLst/>
+              </a:prstGeom>
+              <a:noFill/>
+            </p:spPr>
+            <p:txBody>
+              <a:bodyPr wrap="square" rtlCol="0">
+                <a:spAutoFit/>
+              </a:bodyPr>
+              <a:lstStyle/>
+              <a:p>
+                <a:pPr marL="285750" indent="-285750">
+                  <a:buFont typeface="Arial" panose="020B0604020202020204" pitchFamily="34" charset="0"/>
+                  <a:buChar char="•"/>
+                </a:pPr>
+                <a:r>
+                  <a:rPr lang="en-US" sz="1600" dirty="0" smtClean="0"/>
+                  <a:t>Using Computer Vision (CV) techniques (</a:t>
+                </a:r>
+                <a:r>
+                  <a:rPr lang="en-US" sz="1600" dirty="0" err="1" smtClean="0"/>
+                  <a:t>OpenCV</a:t>
+                </a:r>
+                <a:r>
+                  <a:rPr lang="en-US" sz="1600" dirty="0" smtClean="0"/>
+                  <a:t> 2.4.12)</a:t>
+                </a:r>
+              </a:p>
+              <a:p>
+                <a:pPr marL="742950" lvl="1" indent="-285750">
+                  <a:buFont typeface="Arial" panose="020B0604020202020204" pitchFamily="34" charset="0"/>
+                  <a:buChar char="•"/>
+                </a:pPr>
+                <a:r>
+                  <a:rPr lang="en-US" sz="1600" dirty="0" smtClean="0"/>
+                  <a:t>Convert Source Frame and Video Frames to </a:t>
+                </a:r>
+                <a:r>
+                  <a:rPr lang="en-US" sz="1600" dirty="0" smtClean="0"/>
+                  <a:t>Grayscale</a:t>
+                </a:r>
+                <a:endParaRPr lang="en-US" sz="1600" dirty="0" smtClean="0"/>
+              </a:p>
+              <a:p>
+                <a:pPr marL="742950" lvl="1" indent="-285750">
+                  <a:buFont typeface="Arial" panose="020B0604020202020204" pitchFamily="34" charset="0"/>
+                  <a:buChar char="•"/>
+                </a:pPr>
+                <a:r>
+                  <a:rPr lang="en-US" sz="1600" dirty="0"/>
+                  <a:t>Detect Features using Speeded up robust features (SURF)</a:t>
+                </a:r>
+              </a:p>
+              <a:p>
+                <a:pPr marL="1200150" lvl="2" indent="-285750">
+                  <a:buFont typeface="Arial" panose="020B0604020202020204" pitchFamily="34" charset="0"/>
+                  <a:buChar char="•"/>
+                </a:pPr>
+                <a:r>
+                  <a:rPr lang="en-US" sz="1600" dirty="0"/>
+                  <a:t>Several times faster than SIFT</a:t>
+                </a:r>
+              </a:p>
+              <a:p>
+                <a:pPr marL="1200150" lvl="2" indent="-285750">
+                  <a:buFont typeface="Arial" panose="020B0604020202020204" pitchFamily="34" charset="0"/>
+                  <a:buChar char="•"/>
+                </a:pPr>
+                <a:r>
+                  <a:rPr lang="en-US" sz="1600" dirty="0"/>
+                  <a:t>Scale Invariant (Loss in Interpolation)</a:t>
+                </a:r>
+              </a:p>
+              <a:p>
+                <a:pPr marL="1200150" lvl="2" indent="-285750">
+                  <a:buFont typeface="Arial" panose="020B0604020202020204" pitchFamily="34" charset="0"/>
+                  <a:buChar char="•"/>
+                </a:pPr>
+                <a:r>
+                  <a:rPr lang="en-US" sz="1600" dirty="0"/>
+                  <a:t>Rotation Invariant</a:t>
+                </a:r>
+              </a:p>
+              <a:p>
+                <a:pPr marL="1200150" lvl="2" indent="-285750">
+                  <a:buFont typeface="Arial" panose="020B0604020202020204" pitchFamily="34" charset="0"/>
+                  <a:buChar char="•"/>
+                </a:pPr>
+                <a:r>
+                  <a:rPr lang="en-US" sz="1600" dirty="0" smtClean="0"/>
+                  <a:t>Mask Using </a:t>
+                </a:r>
+                <a:r>
+                  <a:rPr lang="en-US" sz="1600" dirty="0" smtClean="0"/>
+                  <a:t>Region Of Interest (ROI) </a:t>
+                </a:r>
+                <a:r>
+                  <a:rPr lang="en-US" sz="1600" dirty="0" smtClean="0"/>
+                  <a:t>50%</a:t>
+                </a:r>
+                <a:endParaRPr lang="en-US" sz="1600" dirty="0" smtClean="0"/>
+              </a:p>
+              <a:p>
+                <a:pPr marL="742950" lvl="1" indent="-285750">
+                  <a:buFont typeface="Arial" panose="020B0604020202020204" pitchFamily="34" charset="0"/>
+                  <a:buChar char="•"/>
+                </a:pPr>
+                <a:r>
+                  <a:rPr lang="en-US" sz="1600" dirty="0" smtClean="0"/>
+                  <a:t>Extract Descriptors </a:t>
+                </a:r>
+                <a:r>
+                  <a:rPr lang="en-US" sz="1600" dirty="0"/>
+                  <a:t>(both Source and Video </a:t>
+                </a:r>
+                <a:r>
+                  <a:rPr lang="en-US" sz="1600" dirty="0" smtClean="0"/>
+                  <a:t>Frame)</a:t>
+                </a:r>
+                <a:endParaRPr lang="en-US" sz="1600" dirty="0"/>
+              </a:p>
+              <a:p>
+                <a:pPr marL="742950" lvl="1" indent="-285750">
+                  <a:buFont typeface="Arial" panose="020B0604020202020204" pitchFamily="34" charset="0"/>
+                  <a:buChar char="•"/>
+                </a:pPr>
+                <a:r>
+                  <a:rPr lang="en-US" sz="1600" dirty="0" smtClean="0"/>
+                  <a:t>Brute Force Match Descriptors (between Source and Video Frame)</a:t>
+                </a:r>
+              </a:p>
+              <a:p>
+                <a:pPr marL="742950" lvl="1" indent="-285750">
+                  <a:buFont typeface="Arial" panose="020B0604020202020204" pitchFamily="34" charset="0"/>
+                  <a:buChar char="•"/>
+                </a:pPr>
+                <a:r>
+                  <a:rPr lang="en-US" sz="1600" dirty="0" smtClean="0"/>
+                  <a:t>Remove Outliers</a:t>
+                </a:r>
+              </a:p>
+              <a:p>
+                <a:pPr marL="1200150" lvl="2" indent="-285750">
+                  <a:buFont typeface="Arial" panose="020B0604020202020204" pitchFamily="34" charset="0"/>
+                  <a:buChar char="•"/>
+                </a:pPr>
+                <a:r>
+                  <a:rPr lang="en-US" sz="1600" dirty="0" smtClean="0"/>
+                  <a:t>Ignore Features that have moved more than </a:t>
+                </a:r>
+                <a14:m>
+                  <m:oMath xmlns:m="http://schemas.openxmlformats.org/officeDocument/2006/math">
+                    <m:rad>
+                      <m:radPr>
+                        <m:degHide m:val="on"/>
+                        <m:ctrlPr>
+                          <a:rPr lang="en-US" sz="1600" b="0" i="1" smtClean="0">
+                            <a:latin typeface="Cambria Math"/>
+                          </a:rPr>
+                        </m:ctrlPr>
+                      </m:radPr>
+                      <m:deg/>
+                      <m:e>
+                        <m:r>
+                          <a:rPr lang="en-US" sz="1600" b="0" i="1" smtClean="0">
+                            <a:latin typeface="Cambria Math"/>
+                          </a:rPr>
+                          <m:t>162</m:t>
+                        </m:r>
+                      </m:e>
+                    </m:rad>
+                    <m:r>
+                      <a:rPr lang="en-US" sz="1600" b="0" i="1" smtClean="0">
+                        <a:latin typeface="Cambria Math"/>
+                      </a:rPr>
+                      <m:t> </m:t>
+                    </m:r>
+                  </m:oMath>
+                </a14:m>
+                <a:r>
+                  <a:rPr lang="en-US" sz="1600" dirty="0" smtClean="0"/>
+                  <a:t>9px</a:t>
+                </a:r>
+                <a:endParaRPr lang="en-US" sz="1600" dirty="0" smtClean="0"/>
+              </a:p>
+              <a:p>
+                <a:pPr marL="742950" lvl="1" indent="-285750">
+                  <a:buFont typeface="Arial" panose="020B0604020202020204" pitchFamily="34" charset="0"/>
+                  <a:buChar char="•"/>
+                </a:pPr>
+                <a:r>
+                  <a:rPr lang="en-US" sz="1600" dirty="0" smtClean="0"/>
+                  <a:t>Consider First </a:t>
+                </a:r>
+                <a:r>
+                  <a:rPr lang="en-US" sz="1600" dirty="0" smtClean="0"/>
+                  <a:t>30 (arbitrary) </a:t>
+                </a:r>
+                <a:r>
+                  <a:rPr lang="en-US" sz="1600" dirty="0" smtClean="0"/>
+                  <a:t>Good Features</a:t>
+                </a:r>
+              </a:p>
+              <a:p>
+                <a:pPr marL="742950" lvl="1" indent="-285750">
+                  <a:buFont typeface="Arial" panose="020B0604020202020204" pitchFamily="34" charset="0"/>
+                  <a:buChar char="•"/>
+                </a:pPr>
+                <a:r>
+                  <a:rPr lang="en-US" sz="1600" dirty="0" smtClean="0"/>
+                  <a:t>Compute </a:t>
+                </a:r>
+                <a:r>
+                  <a:rPr lang="en-US" sz="1600" dirty="0" err="1" smtClean="0"/>
+                  <a:t>Homography</a:t>
+                </a:r>
+                <a:r>
+                  <a:rPr lang="en-US" sz="1600" dirty="0" smtClean="0"/>
+                  <a:t> (Quad Projective Transformation)</a:t>
+                </a:r>
+              </a:p>
+              <a:p>
+                <a:pPr marL="742950" lvl="1" indent="-285750">
+                  <a:buFont typeface="Arial" panose="020B0604020202020204" pitchFamily="34" charset="0"/>
+                  <a:buChar char="•"/>
+                </a:pPr>
+                <a:r>
+                  <a:rPr lang="en-US" sz="1600" dirty="0" smtClean="0"/>
+                  <a:t>2D Transform Image </a:t>
+                </a:r>
+                <a:endParaRPr lang="en-US" sz="1600" dirty="0"/>
+              </a:p>
+            </p:txBody>
+          </p:sp>
+        </mc:Choice>
+        <mc:Fallback>
+          <p:sp>
+            <p:nvSpPr>
+              <p:cNvPr id="3" name="TextBox 2"/>
+              <p:cNvSpPr txBox="1">
+                <a:spLocks noRot="1" noChangeAspect="1" noMove="1" noResize="1" noEditPoints="1" noAdjustHandles="1" noChangeArrowheads="1" noChangeShapeType="1" noTextEdit="1"/>
+              </p:cNvSpPr>
+              <p:nvPr/>
+            </p:nvSpPr>
+            <p:spPr>
+              <a:xfrm>
+                <a:off x="323849" y="1257300"/>
+                <a:ext cx="6307687" cy="3808863"/>
+              </a:xfrm>
+              <a:prstGeom prst="rect">
+                <a:avLst/>
+              </a:prstGeom>
+              <a:blipFill rotWithShape="1">
+                <a:blip r:embed="rId3"/>
+                <a:stretch>
+                  <a:fillRect l="-290" t="-480" b="-1120"/>
+                </a:stretch>
+              </a:blipFill>
+            </p:spPr>
+            <p:txBody>
+              <a:bodyPr/>
+              <a:lstStyle/>
+              <a:p>
+                <a:r>
+                  <a:rPr lang="en-US">
+                    <a:noFill/>
+                  </a:rPr>
+                  <a:t> </a:t>
+                </a:r>
+              </a:p>
+            </p:txBody>
+          </p:sp>
+        </mc:Fallback>
+      </mc:AlternateContent>
+    </p:spTree>
+    <p:extLst>
+      <p:ext uri="{BB962C8B-B14F-4D97-AF65-F5344CB8AC3E}">
+        <p14:creationId xmlns:p14="http://schemas.microsoft.com/office/powerpoint/2010/main" val="3371719288"/>
+      </p:ext>
+    </p:extLst>
+  </p:cSld>
+  <p:clrMapOvr>
+    <a:masterClrMapping/>
+  </p:clrMapOvr>
+  <p:timing>
+    <p:tnLst>
+      <p:par>
+        <p:cTn id="1" dur="indefinite" restart="never" nodeType="tmRoot"/>
+      </p:par>
+    </p:tnLst>
+  </p:timing>
 </p:sld>
 </file>
 
@@ -2241,7 +2459,7 @@
               <a:defRPr/>
             </a:pPr>
             <a:r>
-              <a:rPr lang="en-US" sz="3200" b="1" smtClean="0">
+              <a:rPr lang="en-US" sz="3200" b="1" dirty="0" smtClean="0">
                 <a:solidFill>
                   <a:srgbClr val="990000"/>
                 </a:solidFill>
@@ -2284,22 +2502,193 @@
                 <a:cs typeface="Arial"/>
               </a:rPr>
             </a:br>
-            <a:r>
-              <a:rPr kumimoji="0" lang="en-US" sz="2750" u="none" strike="noStrike" kern="1200" cap="none" spc="0" normalizeH="0" baseline="0" noProof="0" dirty="0" smtClean="0">
-                <a:ln>
-                  <a:noFill/>
-                </a:ln>
-                <a:solidFill>
-                  <a:srgbClr val="990000"/>
-                </a:solidFill>
-                <a:effectLst/>
-                <a:uLnTx/>
-                <a:uFillTx/>
-                <a:latin typeface="Arial"/>
-                <a:ea typeface="+mj-ea"/>
-                <a:cs typeface="Arial"/>
-              </a:rPr>
-              <a:t>Presentation Subtitle</a:t>
+            <a:endParaRPr kumimoji="0" lang="en-US" sz="2750" u="none" strike="noStrike" kern="1200" cap="none" spc="0" normalizeH="0" baseline="0" noProof="0" dirty="0" smtClean="0">
+              <a:ln>
+                <a:noFill/>
+              </a:ln>
+              <a:solidFill>
+                <a:srgbClr val="990000"/>
+              </a:solidFill>
+              <a:effectLst/>
+              <a:uLnTx/>
+              <a:uFillTx/>
+              <a:latin typeface="Arial"/>
+              <a:ea typeface="+mj-ea"/>
+              <a:cs typeface="Arial"/>
+            </a:endParaRPr>
+          </a:p>
+        </p:txBody>
+      </p:sp>
+      <p:sp>
+        <p:nvSpPr>
+          <p:cNvPr id="3" name="TextBox 2"/>
+          <p:cNvSpPr txBox="1"/>
+          <p:nvPr/>
+        </p:nvSpPr>
+        <p:spPr>
+          <a:xfrm>
+            <a:off x="366132" y="906922"/>
+            <a:ext cx="7957472" cy="4031873"/>
+          </a:xfrm>
+          <a:prstGeom prst="rect">
+            <a:avLst/>
+          </a:prstGeom>
+          <a:noFill/>
+        </p:spPr>
+        <p:txBody>
+          <a:bodyPr wrap="square" rtlCol="0">
+            <a:spAutoFit/>
+          </a:bodyPr>
+          <a:lstStyle/>
+          <a:p>
+            <a:pPr marL="285750" indent="-285750">
+              <a:buFont typeface="Arial" panose="020B0604020202020204" pitchFamily="34" charset="0"/>
+              <a:buChar char="•"/>
+            </a:pPr>
+            <a:r>
+              <a:rPr lang="en-US" sz="1600" dirty="0" smtClean="0"/>
+              <a:t>Audio Video Player</a:t>
+            </a:r>
+          </a:p>
+          <a:p>
+            <a:pPr marL="742950" lvl="1" indent="-285750">
+              <a:buFont typeface="Arial" panose="020B0604020202020204" pitchFamily="34" charset="0"/>
+              <a:buChar char="•"/>
+            </a:pPr>
+            <a:r>
+              <a:rPr lang="en-US" sz="1600" dirty="0" smtClean="0"/>
+              <a:t>Attempts were made to analyze audio to outlie regions where there were no human voice (imperceptible to viewer). </a:t>
+            </a:r>
+          </a:p>
+          <a:p>
+            <a:pPr marL="742950" lvl="1" indent="-285750">
+              <a:buFont typeface="Arial" panose="020B0604020202020204" pitchFamily="34" charset="0"/>
+              <a:buChar char="•"/>
+            </a:pPr>
+            <a:r>
+              <a:rPr lang="en-US" sz="1600" dirty="0" smtClean="0"/>
+              <a:t>Rendering Timer unreliable (use of deterministic clock instead to guarantee 15 Hz)</a:t>
+            </a:r>
+          </a:p>
+          <a:p>
+            <a:pPr marL="285750" indent="-285750">
+              <a:buFont typeface="Arial" panose="020B0604020202020204" pitchFamily="34" charset="0"/>
+              <a:buChar char="•"/>
+            </a:pPr>
+            <a:r>
+              <a:rPr lang="en-US" sz="1600" dirty="0" smtClean="0"/>
+              <a:t>Summarization</a:t>
+            </a:r>
+          </a:p>
+          <a:p>
+            <a:pPr marL="742950" lvl="1" indent="-285750">
+              <a:buFont typeface="Arial" panose="020B0604020202020204" pitchFamily="34" charset="0"/>
+              <a:buChar char="•"/>
+            </a:pPr>
+            <a:r>
+              <a:rPr lang="en-US" sz="1600" dirty="0" smtClean="0"/>
+              <a:t>Consolidate analysis to determine inliers.</a:t>
+            </a:r>
+          </a:p>
+          <a:p>
+            <a:pPr marL="1200150" lvl="2" indent="-285750">
+              <a:buFont typeface="Arial" panose="020B0604020202020204" pitchFamily="34" charset="0"/>
+              <a:buChar char="•"/>
+            </a:pPr>
+            <a:r>
+              <a:rPr lang="en-US" sz="1600" dirty="0" smtClean="0"/>
+              <a:t>X-squared, Color Histogram, Entropy, Euclidean Distance</a:t>
+            </a:r>
+          </a:p>
+          <a:p>
+            <a:pPr marL="742950" lvl="1" indent="-285750">
+              <a:buFont typeface="Arial" panose="020B0604020202020204" pitchFamily="34" charset="0"/>
+              <a:buChar char="•"/>
+            </a:pPr>
+            <a:r>
+              <a:rPr lang="en-US" sz="1600" dirty="0" smtClean="0"/>
+              <a:t>Segment image for higher key point resolution.</a:t>
+            </a:r>
+          </a:p>
+          <a:p>
+            <a:pPr marL="285750" indent="-285750">
+              <a:buFont typeface="Arial" panose="020B0604020202020204" pitchFamily="34" charset="0"/>
+              <a:buChar char="•"/>
+            </a:pPr>
+            <a:r>
+              <a:rPr lang="en-US" sz="1600" dirty="0" smtClean="0"/>
+              <a:t>Reference</a:t>
+            </a:r>
+          </a:p>
+          <a:p>
+            <a:pPr marL="742950" lvl="1" indent="-285750">
+              <a:buFont typeface="Arial" panose="020B0604020202020204" pitchFamily="34" charset="0"/>
+              <a:buChar char="•"/>
+            </a:pPr>
+            <a:r>
+              <a:rPr lang="en-US" sz="1600" dirty="0" smtClean="0"/>
+              <a:t>Speed up computation.</a:t>
+            </a:r>
+            <a:endParaRPr lang="en-US" sz="1600" dirty="0"/>
+          </a:p>
+          <a:p>
+            <a:pPr marL="742950" lvl="1" indent="-285750">
+              <a:buFont typeface="Arial" panose="020B0604020202020204" pitchFamily="34" charset="0"/>
+              <a:buChar char="•"/>
+            </a:pPr>
+            <a:r>
+              <a:rPr lang="en-US" sz="1600" dirty="0" smtClean="0"/>
+              <a:t>Memory leaks produced from usage of CV libraries. (SURF is not free!)</a:t>
+            </a:r>
+          </a:p>
+          <a:p>
+            <a:pPr marL="285750" indent="-285750">
+              <a:buFont typeface="Arial" panose="020B0604020202020204" pitchFamily="34" charset="0"/>
+              <a:buChar char="•"/>
+            </a:pPr>
+            <a:r>
+              <a:rPr lang="en-US" sz="1600" dirty="0" smtClean="0"/>
+              <a:t>Stabilization</a:t>
+            </a:r>
+          </a:p>
+          <a:p>
+            <a:pPr marL="742950" lvl="1" indent="-285750">
+              <a:buFont typeface="Arial" panose="020B0604020202020204" pitchFamily="34" charset="0"/>
+              <a:buChar char="•"/>
+            </a:pPr>
+            <a:r>
+              <a:rPr lang="en-US" sz="1600" dirty="0" smtClean="0"/>
+              <a:t>Extract Head-Motion vs general object tracking (Improve outlier methods)</a:t>
+            </a:r>
+          </a:p>
+          <a:p>
+            <a:pPr marL="742950" lvl="1" indent="-285750">
+              <a:buFont typeface="Arial" panose="020B0604020202020204" pitchFamily="34" charset="0"/>
+              <a:buChar char="•"/>
+            </a:pPr>
+            <a:r>
+              <a:rPr lang="en-US" sz="1600" dirty="0" smtClean="0"/>
+              <a:t>To reduce additional outliers focus ROI to only the 4 corners</a:t>
+            </a:r>
+          </a:p>
+          <a:p>
+            <a:pPr marL="285750" indent="-285750">
+              <a:buFont typeface="Arial" panose="020B0604020202020204" pitchFamily="34" charset="0"/>
+              <a:buChar char="•"/>
+            </a:pPr>
+            <a:r>
+              <a:rPr lang="en-US" sz="1600" dirty="0" smtClean="0"/>
+              <a:t>General Bugs</a:t>
+            </a:r>
+          </a:p>
+          <a:p>
+            <a:pPr marL="742950" lvl="1" indent="-285750">
+              <a:buFont typeface="Arial" panose="020B0604020202020204" pitchFamily="34" charset="0"/>
+              <a:buChar char="•"/>
+            </a:pPr>
+            <a:r>
+              <a:rPr lang="en-US" sz="1600" dirty="0" smtClean="0"/>
+              <a:t>Bugs related to Integration</a:t>
             </a:r>
           </a:p>
         </p:txBody>
@@ -2314,6 +2703,13 @@
   <p:clrMapOvr>
     <a:masterClrMapping/>
   </p:clrMapOvr>
+  <p:timing>
+    <p:tnLst>
+      <p:par>
+        <p:cTn id="1" dur="indefinite" restart="never" nodeType="tmRoot"/>
+      </p:par>
+    </p:tnLst>
+  </p:timing>
 </p:sld>
 </file>
 
@@ -2444,7 +2840,7 @@
         <p:spPr>
           <a:xfrm>
             <a:off x="381000" y="1857375"/>
-            <a:ext cx="8248650" cy="2677656"/>
+            <a:ext cx="8248650" cy="3046988"/>
           </a:xfrm>
           <a:prstGeom prst="rect">
             <a:avLst/>
@@ -2604,6 +3000,54 @@
               <a:buFont typeface="Arial" panose="020B0604020202020204" pitchFamily="34" charset="0"/>
               <a:buChar char="•"/>
             </a:pPr>
+            <a:r>
+              <a:rPr lang="en-US" sz="1200" dirty="0" smtClean="0">
+                <a:latin typeface="Courier New" panose="02070309020205020404" pitchFamily="49" charset="0"/>
+                <a:cs typeface="Courier New" panose="02070309020205020404" pitchFamily="49" charset="0"/>
+              </a:rPr>
+              <a:t>Jiang, H., </a:t>
+            </a:r>
+            <a:r>
+              <a:rPr lang="en-US" sz="1200" dirty="0" err="1" smtClean="0">
+                <a:latin typeface="Courier New" panose="02070309020205020404" pitchFamily="49" charset="0"/>
+                <a:cs typeface="Courier New" panose="02070309020205020404" pitchFamily="49" charset="0"/>
+              </a:rPr>
+              <a:t>Helal</a:t>
+            </a:r>
+            <a:r>
+              <a:rPr lang="en-US" sz="1200" dirty="0" smtClean="0">
+                <a:latin typeface="Courier New" panose="02070309020205020404" pitchFamily="49" charset="0"/>
+                <a:cs typeface="Courier New" panose="02070309020205020404" pitchFamily="49" charset="0"/>
+              </a:rPr>
+              <a:t>, A., </a:t>
+            </a:r>
+            <a:r>
+              <a:rPr lang="en-US" sz="1200" dirty="0" err="1" smtClean="0">
+                <a:latin typeface="Courier New" panose="02070309020205020404" pitchFamily="49" charset="0"/>
+                <a:cs typeface="Courier New" panose="02070309020205020404" pitchFamily="49" charset="0"/>
+              </a:rPr>
+              <a:t>Elmagarmid</a:t>
+            </a:r>
+            <a:r>
+              <a:rPr lang="en-US" sz="1200" dirty="0" smtClean="0">
+                <a:latin typeface="Courier New" panose="02070309020205020404" pitchFamily="49" charset="0"/>
+                <a:cs typeface="Courier New" panose="02070309020205020404" pitchFamily="49" charset="0"/>
+              </a:rPr>
+              <a:t>, A., Joshi, A.: Scene Change Detection for Video Database Management Systems-A Survey</a:t>
+            </a:r>
+          </a:p>
+          <a:p>
+            <a:pPr marL="171450" indent="-171450">
+              <a:buFont typeface="Arial" panose="020B0604020202020204" pitchFamily="34" charset="0"/>
+              <a:buChar char="•"/>
+            </a:pPr>
+            <a:r>
+              <a:rPr lang="en-US" sz="1200" dirty="0" smtClean="0">
+                <a:latin typeface="Courier New" panose="02070309020205020404" pitchFamily="49" charset="0"/>
+                <a:cs typeface="Courier New" panose="02070309020205020404" pitchFamily="49" charset="0"/>
+              </a:rPr>
+              <a:t>Aye, Y.: Speech Recognition Using Zero-Crossing Features</a:t>
+            </a:r>
             <a:endParaRPr lang="en-US" sz="1200" dirty="0">
               <a:latin typeface="Courier New" panose="02070309020205020404" pitchFamily="49" charset="0"/>
               <a:cs typeface="Courier New" panose="02070309020205020404" pitchFamily="49" charset="0"/>
@@ -2682,14 +3126,7 @@
                 <a:latin typeface="Courier New" panose="02070309020205020404" pitchFamily="49" charset="0"/>
                 <a:cs typeface="Courier New" panose="02070309020205020404" pitchFamily="49" charset="0"/>
               </a:rPr>
-              <a:t>	</a:t>
-            </a:r>
-            <a:r>
-              <a:rPr lang="en-US" sz="1200" dirty="0" smtClean="0">
-                <a:latin typeface="Courier New" panose="02070309020205020404" pitchFamily="49" charset="0"/>
-                <a:cs typeface="Courier New" panose="02070309020205020404" pitchFamily="49" charset="0"/>
-              </a:rPr>
-              <a:t>roeiljac@usc.edu</a:t>
+              <a:t>	roeiljac@usc.edu</a:t>
             </a:r>
             <a:endParaRPr lang="en-US" sz="1200" dirty="0">
               <a:latin typeface="Courier New" panose="02070309020205020404" pitchFamily="49" charset="0"/>
@@ -2702,14 +3139,7 @@
                 <a:latin typeface="Courier New" panose="02070309020205020404" pitchFamily="49" charset="0"/>
                 <a:cs typeface="Courier New" panose="02070309020205020404" pitchFamily="49" charset="0"/>
               </a:rPr>
-              <a:t>Timothy </a:t>
-            </a:r>
-            <a:r>
-              <a:rPr lang="en-US" sz="1200" dirty="0" smtClean="0">
-                <a:latin typeface="Courier New" panose="02070309020205020404" pitchFamily="49" charset="0"/>
-                <a:cs typeface="Courier New" panose="02070309020205020404" pitchFamily="49" charset="0"/>
-              </a:rPr>
-              <a:t>Fong,</a:t>
+              <a:t>Timothy Fong,</a:t>
             </a:r>
           </a:p>
           <a:p>
@@ -2718,19 +3148,8 @@
                 <a:latin typeface="Courier New" panose="02070309020205020404" pitchFamily="49" charset="0"/>
                 <a:cs typeface="Courier New" panose="02070309020205020404" pitchFamily="49" charset="0"/>
               </a:rPr>
-              <a:t>	</a:t>
-            </a:r>
-            <a:r>
-              <a:rPr lang="en-US" sz="1200" dirty="0">
-                <a:latin typeface="Courier New" panose="02070309020205020404" pitchFamily="49" charset="0"/>
-                <a:cs typeface="Courier New" panose="02070309020205020404" pitchFamily="49" charset="0"/>
-              </a:rPr>
-              <a:t>timothwf@usc.edu</a:t>
-            </a:r>
-            <a:endParaRPr lang="en-US" sz="1200" dirty="0">
-              <a:latin typeface="Courier New" panose="02070309020205020404" pitchFamily="49" charset="0"/>
-              <a:cs typeface="Courier New" panose="02070309020205020404" pitchFamily="49" charset="0"/>
-            </a:endParaRPr>
+              <a:t>	timothwf@usc.edu</a:t>
+            </a:r>
           </a:p>
         </p:txBody>
       </p:sp>
@@ -2744,6 +3163,13 @@
   <p:clrMapOvr>
     <a:masterClrMapping/>
   </p:clrMapOvr>
+  <p:timing>
+    <p:tnLst>
+      <p:par>
+        <p:cTn id="1" dur="indefinite" restart="never" nodeType="tmRoot"/>
+      </p:par>
+    </p:tnLst>
+  </p:timing>
 </p:sld>
 </file>
 
@@ -2836,24 +3262,7 @@
                 <a:ea typeface="+mj-ea"/>
                 <a:cs typeface="Arial"/>
               </a:rPr>
-              <a:t> Multimedia System </a:t>
-            </a:r>
-            <a:r>
-              <a:rPr kumimoji="0" lang="en-US" sz="3200" b="1" u="none" strike="noStrike" kern="1200" cap="none" spc="0" normalizeH="0" noProof="0" dirty="0" smtClean="0">
-                <a:ln>
-                  <a:noFill/>
-                </a:ln>
-                <a:solidFill>
-                  <a:srgbClr val="990000"/>
-                </a:solidFill>
-                <a:effectLst/>
-                <a:uLnTx/>
-                <a:uFillTx/>
-                <a:latin typeface="Arial"/>
-                <a:ea typeface="+mj-ea"/>
-                <a:cs typeface="Arial"/>
-              </a:rPr>
-              <a:t>Design</a:t>
+              <a:t> Multimedia System Design</a:t>
             </a:r>
             <a:r>
               <a:rPr kumimoji="0" lang="en-US" sz="4400" u="none" strike="noStrike" kern="1200" cap="none" spc="0" normalizeH="0" baseline="0" noProof="0" dirty="0" smtClean="0">
@@ -3138,20 +3547,6 @@
               </a:rPr>
               <a:t>GUI Design</a:t>
             </a:r>
-            <a:endParaRPr kumimoji="0" lang="en-US" sz="1400" u="none" strike="noStrike" kern="1200" cap="none" spc="0" normalizeH="0" baseline="0" noProof="0" dirty="0" smtClean="0">
-              <a:ln>
-                <a:noFill/>
-              </a:ln>
-              <a:solidFill>
-                <a:srgbClr val="990000"/>
-              </a:solidFill>
-              <a:effectLst/>
-              <a:uLnTx/>
-              <a:uFillTx/>
-              <a:latin typeface="Arial"/>
-              <a:ea typeface="+mj-ea"/>
-              <a:cs typeface="Arial"/>
-            </a:endParaRPr>
           </a:p>
         </p:txBody>
       </p:sp>
@@ -3496,6 +3891,7 @@
           </a:bodyPr>
           <a:lstStyle/>
           <a:p>
+            <a:pPr algn="r"/>
             <a:r>
               <a:rPr lang="en-US" sz="1100" dirty="0" smtClean="0"/>
               <a:t>Time Code: Duration</a:t>
@@ -3664,7 +4060,7 @@
         </p:nvSpPr>
         <p:spPr>
           <a:xfrm>
-            <a:off x="2892425" y="5370884"/>
+            <a:off x="2964950" y="5396353"/>
             <a:ext cx="1415050" cy="261610"/>
           </a:xfrm>
           <a:prstGeom prst="rect">
@@ -3745,7 +4141,7 @@
         <p:spPr>
           <a:xfrm flipH="1" flipV="1">
             <a:off x="3283744" y="4854573"/>
-            <a:ext cx="316206" cy="516311"/>
+            <a:ext cx="388731" cy="541780"/>
           </a:xfrm>
           <a:prstGeom prst="line">
             <a:avLst/>
@@ -3782,7 +4178,7 @@
         </p:nvSpPr>
         <p:spPr>
           <a:xfrm>
-            <a:off x="345090" y="5284688"/>
+            <a:off x="1284786" y="5386242"/>
             <a:ext cx="1669051" cy="261610"/>
           </a:xfrm>
           <a:prstGeom prst="rect">
@@ -3808,15 +4204,15 @@
         <p:nvCxnSpPr>
           <p:cNvPr id="39" name="Straight Connector 38"/>
           <p:cNvCxnSpPr>
-            <a:stCxn id="34" idx="3"/>
-            <a:endCxn id="8" idx="1"/>
+            <a:stCxn id="34" idx="0"/>
+            <a:endCxn id="8" idx="2"/>
           </p:cNvCxnSpPr>
           <p:nvPr/>
         </p:nvCxnSpPr>
         <p:spPr>
           <a:xfrm flipV="1">
-            <a:off x="2014141" y="4971652"/>
-            <a:ext cx="1114822" cy="443841"/>
+            <a:off x="2119312" y="5072062"/>
+            <a:ext cx="1087042" cy="314180"/>
           </a:xfrm>
           <a:prstGeom prst="line">
             <a:avLst/>
@@ -3963,6 +4359,478 @@
           </a:p>
         </p:txBody>
       </p:sp>
+      <p:sp>
+        <p:nvSpPr>
+          <p:cNvPr id="25" name="Rectangle 24"/>
+          <p:cNvSpPr/>
+          <p:nvPr/>
+        </p:nvSpPr>
+        <p:spPr>
+          <a:xfrm>
+            <a:off x="2486025" y="4887119"/>
+            <a:ext cx="642938" cy="169068"/>
+          </a:xfrm>
+          <a:prstGeom prst="rect">
+            <a:avLst/>
+          </a:prstGeom>
+          <a:solidFill>
+            <a:srgbClr val="FF9900">
+              <a:alpha val="37000"/>
+            </a:srgbClr>
+          </a:solidFill>
+          <a:ln>
+            <a:noFill/>
+          </a:ln>
+          <a:effectLst/>
+        </p:spPr>
+        <p:style>
+          <a:lnRef idx="1">
+            <a:schemeClr val="accent1"/>
+          </a:lnRef>
+          <a:fillRef idx="3">
+            <a:schemeClr val="accent1"/>
+          </a:fillRef>
+          <a:effectRef idx="2">
+            <a:schemeClr val="accent1"/>
+          </a:effectRef>
+          <a:fontRef idx="minor">
+            <a:schemeClr val="lt1"/>
+          </a:fontRef>
+        </p:style>
+        <p:txBody>
+          <a:bodyPr rtlCol="0" anchor="ctr"/>
+          <a:lstStyle/>
+          <a:p>
+            <a:pPr algn="ctr"/>
+            <a:endParaRPr lang="en-US"/>
+          </a:p>
+        </p:txBody>
+      </p:sp>
+      <p:sp>
+        <p:nvSpPr>
+          <p:cNvPr id="31" name="TextBox 30"/>
+          <p:cNvSpPr txBox="1"/>
+          <p:nvPr/>
+        </p:nvSpPr>
+        <p:spPr>
+          <a:xfrm>
+            <a:off x="442325" y="4864098"/>
+            <a:ext cx="1192800" cy="261610"/>
+          </a:xfrm>
+          <a:prstGeom prst="rect">
+            <a:avLst/>
+          </a:prstGeom>
+          <a:noFill/>
+        </p:spPr>
+        <p:txBody>
+          <a:bodyPr wrap="square" rtlCol="0">
+            <a:spAutoFit/>
+          </a:bodyPr>
+          <a:lstStyle/>
+          <a:p>
+            <a:r>
+              <a:rPr lang="en-US" sz="1100" dirty="0" smtClean="0"/>
+              <a:t>Analysis Button</a:t>
+            </a:r>
+            <a:endParaRPr lang="en-US" sz="1100" dirty="0"/>
+          </a:p>
+        </p:txBody>
+      </p:sp>
+      <p:cxnSp>
+        <p:nvCxnSpPr>
+          <p:cNvPr id="32" name="Straight Connector 31"/>
+          <p:cNvCxnSpPr>
+            <a:stCxn id="31" idx="3"/>
+            <a:endCxn id="25" idx="1"/>
+          </p:cNvCxnSpPr>
+          <p:nvPr/>
+        </p:nvCxnSpPr>
+        <p:spPr>
+          <a:xfrm flipV="1">
+            <a:off x="1635125" y="4971653"/>
+            <a:ext cx="850900" cy="23250"/>
+          </a:xfrm>
+          <a:prstGeom prst="line">
+            <a:avLst/>
+          </a:prstGeom>
+          <a:ln>
+            <a:solidFill>
+              <a:schemeClr val="accent6">
+                <a:lumMod val="75000"/>
+              </a:schemeClr>
+            </a:solidFill>
+          </a:ln>
+          <a:effectLst/>
+        </p:spPr>
+        <p:style>
+          <a:lnRef idx="2">
+            <a:schemeClr val="accent1"/>
+          </a:lnRef>
+          <a:fillRef idx="0">
+            <a:schemeClr val="accent1"/>
+          </a:fillRef>
+          <a:effectRef idx="1">
+            <a:schemeClr val="accent1"/>
+          </a:effectRef>
+          <a:fontRef idx="minor">
+            <a:schemeClr val="tx1"/>
+          </a:fontRef>
+        </p:style>
+      </p:cxnSp>
+      <p:sp>
+        <p:nvSpPr>
+          <p:cNvPr id="35" name="Rectangle 34"/>
+          <p:cNvSpPr/>
+          <p:nvPr/>
+        </p:nvSpPr>
+        <p:spPr>
+          <a:xfrm>
+            <a:off x="2643480" y="1438276"/>
+            <a:ext cx="3852569" cy="2219322"/>
+          </a:xfrm>
+          <a:prstGeom prst="rect">
+            <a:avLst/>
+          </a:prstGeom>
+          <a:solidFill>
+            <a:srgbClr val="FF9900">
+              <a:alpha val="37000"/>
+            </a:srgbClr>
+          </a:solidFill>
+          <a:ln>
+            <a:noFill/>
+          </a:ln>
+          <a:effectLst/>
+        </p:spPr>
+        <p:style>
+          <a:lnRef idx="1">
+            <a:schemeClr val="accent1"/>
+          </a:lnRef>
+          <a:fillRef idx="3">
+            <a:schemeClr val="accent1"/>
+          </a:fillRef>
+          <a:effectRef idx="2">
+            <a:schemeClr val="accent1"/>
+          </a:effectRef>
+          <a:fontRef idx="minor">
+            <a:schemeClr val="lt1"/>
+          </a:fontRef>
+        </p:style>
+        <p:txBody>
+          <a:bodyPr rtlCol="0" anchor="ctr"/>
+          <a:lstStyle/>
+          <a:p>
+            <a:pPr algn="ctr"/>
+            <a:endParaRPr lang="en-US"/>
+          </a:p>
+        </p:txBody>
+      </p:sp>
+      <p:sp>
+        <p:nvSpPr>
+          <p:cNvPr id="36" name="TextBox 35"/>
+          <p:cNvSpPr txBox="1"/>
+          <p:nvPr/>
+        </p:nvSpPr>
+        <p:spPr>
+          <a:xfrm>
+            <a:off x="442325" y="2110744"/>
+            <a:ext cx="1192800" cy="261610"/>
+          </a:xfrm>
+          <a:prstGeom prst="rect">
+            <a:avLst/>
+          </a:prstGeom>
+          <a:noFill/>
+        </p:spPr>
+        <p:txBody>
+          <a:bodyPr wrap="square" rtlCol="0">
+            <a:spAutoFit/>
+          </a:bodyPr>
+          <a:lstStyle/>
+          <a:p>
+            <a:r>
+              <a:rPr lang="en-US" sz="1100" dirty="0" smtClean="0"/>
+              <a:t>Playback Frame</a:t>
+            </a:r>
+            <a:endParaRPr lang="en-US" sz="1100" dirty="0"/>
+          </a:p>
+        </p:txBody>
+      </p:sp>
+      <p:cxnSp>
+        <p:nvCxnSpPr>
+          <p:cNvPr id="37" name="Straight Connector 36"/>
+          <p:cNvCxnSpPr>
+            <a:stCxn id="36" idx="3"/>
+            <a:endCxn id="35" idx="1"/>
+          </p:cNvCxnSpPr>
+          <p:nvPr/>
+        </p:nvCxnSpPr>
+        <p:spPr>
+          <a:xfrm>
+            <a:off x="1635125" y="2241549"/>
+            <a:ext cx="1008355" cy="306388"/>
+          </a:xfrm>
+          <a:prstGeom prst="line">
+            <a:avLst/>
+          </a:prstGeom>
+          <a:ln>
+            <a:solidFill>
+              <a:schemeClr val="accent6">
+                <a:lumMod val="75000"/>
+              </a:schemeClr>
+            </a:solidFill>
+          </a:ln>
+          <a:effectLst/>
+        </p:spPr>
+        <p:style>
+          <a:lnRef idx="2">
+            <a:schemeClr val="accent1"/>
+          </a:lnRef>
+          <a:fillRef idx="0">
+            <a:schemeClr val="accent1"/>
+          </a:fillRef>
+          <a:effectRef idx="1">
+            <a:schemeClr val="accent1"/>
+          </a:effectRef>
+          <a:fontRef idx="minor">
+            <a:schemeClr val="tx1"/>
+          </a:fontRef>
+        </p:style>
+      </p:cxnSp>
+      <p:sp>
+        <p:nvSpPr>
+          <p:cNvPr id="42" name="Rectangle 41"/>
+          <p:cNvSpPr/>
+          <p:nvPr/>
+        </p:nvSpPr>
+        <p:spPr>
+          <a:xfrm>
+            <a:off x="5014913" y="4885527"/>
+            <a:ext cx="514350" cy="169068"/>
+          </a:xfrm>
+          <a:prstGeom prst="rect">
+            <a:avLst/>
+          </a:prstGeom>
+          <a:solidFill>
+            <a:srgbClr val="FF9900">
+              <a:alpha val="37000"/>
+            </a:srgbClr>
+          </a:solidFill>
+          <a:ln>
+            <a:noFill/>
+          </a:ln>
+          <a:effectLst/>
+        </p:spPr>
+        <p:style>
+          <a:lnRef idx="1">
+            <a:schemeClr val="accent1"/>
+          </a:lnRef>
+          <a:fillRef idx="3">
+            <a:schemeClr val="accent1"/>
+          </a:fillRef>
+          <a:effectRef idx="2">
+            <a:schemeClr val="accent1"/>
+          </a:effectRef>
+          <a:fontRef idx="minor">
+            <a:schemeClr val="lt1"/>
+          </a:fontRef>
+        </p:style>
+        <p:txBody>
+          <a:bodyPr rtlCol="0" anchor="ctr"/>
+          <a:lstStyle/>
+          <a:p>
+            <a:pPr algn="ctr"/>
+            <a:endParaRPr lang="en-US"/>
+          </a:p>
+        </p:txBody>
+      </p:sp>
+      <p:sp>
+        <p:nvSpPr>
+          <p:cNvPr id="45" name="Rectangle 44"/>
+          <p:cNvSpPr/>
+          <p:nvPr/>
+        </p:nvSpPr>
+        <p:spPr>
+          <a:xfrm>
+            <a:off x="5557838" y="4885527"/>
+            <a:ext cx="514350" cy="169068"/>
+          </a:xfrm>
+          <a:prstGeom prst="rect">
+            <a:avLst/>
+          </a:prstGeom>
+          <a:solidFill>
+            <a:srgbClr val="FF9900">
+              <a:alpha val="37000"/>
+            </a:srgbClr>
+          </a:solidFill>
+          <a:ln>
+            <a:noFill/>
+          </a:ln>
+          <a:effectLst/>
+        </p:spPr>
+        <p:style>
+          <a:lnRef idx="1">
+            <a:schemeClr val="accent1"/>
+          </a:lnRef>
+          <a:fillRef idx="3">
+            <a:schemeClr val="accent1"/>
+          </a:fillRef>
+          <a:effectRef idx="2">
+            <a:schemeClr val="accent1"/>
+          </a:effectRef>
+          <a:fontRef idx="minor">
+            <a:schemeClr val="lt1"/>
+          </a:fontRef>
+        </p:style>
+        <p:txBody>
+          <a:bodyPr rtlCol="0" anchor="ctr"/>
+          <a:lstStyle/>
+          <a:p>
+            <a:pPr algn="ctr"/>
+            <a:endParaRPr lang="en-US"/>
+          </a:p>
+        </p:txBody>
+      </p:sp>
+      <p:sp>
+        <p:nvSpPr>
+          <p:cNvPr id="46" name="TextBox 45"/>
+          <p:cNvSpPr txBox="1"/>
+          <p:nvPr/>
+        </p:nvSpPr>
+        <p:spPr>
+          <a:xfrm>
+            <a:off x="5931400" y="5265548"/>
+            <a:ext cx="1192800" cy="430887"/>
+          </a:xfrm>
+          <a:prstGeom prst="rect">
+            <a:avLst/>
+          </a:prstGeom>
+          <a:noFill/>
+        </p:spPr>
+        <p:txBody>
+          <a:bodyPr wrap="square" rtlCol="0">
+            <a:spAutoFit/>
+          </a:bodyPr>
+          <a:lstStyle/>
+          <a:p>
+            <a:pPr algn="r"/>
+            <a:r>
+              <a:rPr lang="en-US" sz="1100" dirty="0" smtClean="0"/>
+              <a:t>Play/Pause Button</a:t>
+            </a:r>
+            <a:endParaRPr lang="en-US" sz="1100" dirty="0"/>
+          </a:p>
+        </p:txBody>
+      </p:sp>
+      <p:sp>
+        <p:nvSpPr>
+          <p:cNvPr id="48" name="TextBox 47"/>
+          <p:cNvSpPr txBox="1"/>
+          <p:nvPr/>
+        </p:nvSpPr>
+        <p:spPr>
+          <a:xfrm>
+            <a:off x="7496675" y="4279899"/>
+            <a:ext cx="596400" cy="261610"/>
+          </a:xfrm>
+          <a:prstGeom prst="rect">
+            <a:avLst/>
+          </a:prstGeom>
+          <a:noFill/>
+        </p:spPr>
+        <p:txBody>
+          <a:bodyPr wrap="square" rtlCol="0">
+            <a:spAutoFit/>
+          </a:bodyPr>
+          <a:lstStyle/>
+          <a:p>
+            <a:r>
+              <a:rPr lang="en-US" sz="1100" dirty="0" smtClean="0"/>
+              <a:t>Stop</a:t>
+            </a:r>
+            <a:endParaRPr lang="en-US" sz="1100" dirty="0"/>
+          </a:p>
+        </p:txBody>
+      </p:sp>
+      <p:cxnSp>
+        <p:nvCxnSpPr>
+          <p:cNvPr id="49" name="Straight Connector 48"/>
+          <p:cNvCxnSpPr>
+            <a:stCxn id="48" idx="1"/>
+            <a:endCxn id="45" idx="3"/>
+          </p:cNvCxnSpPr>
+          <p:nvPr/>
+        </p:nvCxnSpPr>
+        <p:spPr>
+          <a:xfrm flipH="1">
+            <a:off x="6072188" y="4410704"/>
+            <a:ext cx="1424487" cy="559357"/>
+          </a:xfrm>
+          <a:prstGeom prst="line">
+            <a:avLst/>
+          </a:prstGeom>
+          <a:ln>
+            <a:solidFill>
+              <a:schemeClr val="accent6">
+                <a:lumMod val="75000"/>
+              </a:schemeClr>
+            </a:solidFill>
+          </a:ln>
+          <a:effectLst/>
+        </p:spPr>
+        <p:style>
+          <a:lnRef idx="2">
+            <a:schemeClr val="accent1"/>
+          </a:lnRef>
+          <a:fillRef idx="0">
+            <a:schemeClr val="accent1"/>
+          </a:fillRef>
+          <a:effectRef idx="1">
+            <a:schemeClr val="accent1"/>
+          </a:effectRef>
+          <a:fontRef idx="minor">
+            <a:schemeClr val="tx1"/>
+          </a:fontRef>
+        </p:style>
+      </p:cxnSp>
+      <p:cxnSp>
+        <p:nvCxnSpPr>
+          <p:cNvPr id="50" name="Straight Connector 49"/>
+          <p:cNvCxnSpPr>
+            <a:stCxn id="46" idx="0"/>
+          </p:cNvCxnSpPr>
+          <p:nvPr/>
+        </p:nvCxnSpPr>
+        <p:spPr>
+          <a:xfrm flipH="1" flipV="1">
+            <a:off x="5272088" y="5072062"/>
+            <a:ext cx="1255712" cy="193486"/>
+          </a:xfrm>
+          <a:prstGeom prst="line">
+            <a:avLst/>
+          </a:prstGeom>
+          <a:ln>
+            <a:solidFill>
+              <a:schemeClr val="accent6">
+                <a:lumMod val="75000"/>
+              </a:schemeClr>
+            </a:solidFill>
+          </a:ln>
+          <a:effectLst/>
+        </p:spPr>
+        <p:style>
+          <a:lnRef idx="2">
+            <a:schemeClr val="accent1"/>
+          </a:lnRef>
+          <a:fillRef idx="0">
+            <a:schemeClr val="accent1"/>
+          </a:fillRef>
+          <a:effectRef idx="1">
+            <a:schemeClr val="accent1"/>
+          </a:effectRef>
+          <a:fontRef idx="minor">
+            <a:schemeClr val="tx1"/>
+          </a:fontRef>
+        </p:style>
+      </p:cxnSp>
     </p:spTree>
     <p:extLst>
       <p:ext uri="{BB962C8B-B14F-4D97-AF65-F5344CB8AC3E}">
@@ -4094,20 +4962,6 @@
               </a:rPr>
               <a:t>Algorithm Design</a:t>
             </a:r>
-            <a:endParaRPr kumimoji="0" lang="en-US" sz="1400" u="none" strike="noStrike" kern="1200" cap="none" spc="0" normalizeH="0" baseline="0" noProof="0" dirty="0" smtClean="0">
-              <a:ln>
-                <a:noFill/>
-              </a:ln>
-              <a:solidFill>
-                <a:srgbClr val="990000"/>
-              </a:solidFill>
-              <a:effectLst/>
-              <a:uLnTx/>
-              <a:uFillTx/>
-              <a:latin typeface="Arial"/>
-              <a:ea typeface="+mj-ea"/>
-              <a:cs typeface="Arial"/>
-            </a:endParaRPr>
           </a:p>
         </p:txBody>
       </p:sp>
@@ -4119,8 +4973,8 @@
         </p:nvSpPr>
         <p:spPr>
           <a:xfrm>
-            <a:off x="381000" y="1857375"/>
-            <a:ext cx="8248650" cy="1754326"/>
+            <a:off x="381000" y="1558272"/>
+            <a:ext cx="8248650" cy="2031325"/>
           </a:xfrm>
           <a:prstGeom prst="rect">
             <a:avLst/>
@@ -4153,7 +5007,7 @@
               <a:rPr lang="en-US" dirty="0" smtClean="0">
                 <a:cs typeface="Courier New" panose="02070309020205020404" pitchFamily="49" charset="0"/>
               </a:rPr>
-              <a:t>Decoupling</a:t>
+              <a:t>Decoupling of “Disk Read” and “Display Buffer Writer”</a:t>
             </a:r>
             <a:endParaRPr lang="en-US" dirty="0">
               <a:cs typeface="Courier New" panose="02070309020205020404" pitchFamily="49" charset="0"/>
@@ -4168,7 +5022,7 @@
               <a:rPr lang="en-US" dirty="0" smtClean="0">
                 <a:cs typeface="Courier New" panose="02070309020205020404" pitchFamily="49" charset="0"/>
               </a:rPr>
-              <a:t>Buffered</a:t>
+              <a:t>Buffered </a:t>
             </a:r>
             <a:endParaRPr lang="en-US" dirty="0">
               <a:cs typeface="Courier New" panose="02070309020205020404" pitchFamily="49" charset="0"/>
@@ -4183,8 +5037,29 @@
               <a:rPr lang="en-US" dirty="0" smtClean="0">
                 <a:cs typeface="Courier New" panose="02070309020205020404" pitchFamily="49" charset="0"/>
               </a:rPr>
-              <a:t>Timer invariance</a:t>
-            </a:r>
+              <a:t>Timer </a:t>
+            </a:r>
+            <a:r>
+              <a:rPr lang="en-US" dirty="0" smtClean="0">
+                <a:cs typeface="Courier New" panose="02070309020205020404" pitchFamily="49" charset="0"/>
+              </a:rPr>
+              <a:t>discrepancies</a:t>
+            </a:r>
+          </a:p>
+          <a:p>
+            <a:pPr marL="1200150" lvl="2" indent="-285750">
+              <a:buFont typeface="Arial" panose="020B0604020202020204" pitchFamily="34" charset="0"/>
+              <a:buChar char="•"/>
+            </a:pPr>
+            <a:r>
+              <a:rPr lang="en-US" dirty="0" smtClean="0">
+                <a:cs typeface="Courier New" panose="02070309020205020404" pitchFamily="49" charset="0"/>
+              </a:rPr>
+              <a:t>Overflows or Underflows</a:t>
+            </a:r>
+            <a:endParaRPr lang="en-US" dirty="0" smtClean="0">
+              <a:cs typeface="Courier New" panose="02070309020205020404" pitchFamily="49" charset="0"/>
+            </a:endParaRPr>
           </a:p>
           <a:p>
             <a:pPr marL="285750" indent="-285750">
@@ -4207,13 +5082,19 @@
               <a:rPr lang="en-US" dirty="0" smtClean="0">
                 <a:cs typeface="Courier New" panose="02070309020205020404" pitchFamily="49" charset="0"/>
               </a:rPr>
-              <a:t>Drift </a:t>
+              <a:t>Drift due to </a:t>
             </a:r>
             <a:r>
               <a:rPr lang="en-US" dirty="0" smtClean="0">
                 <a:cs typeface="Courier New" panose="02070309020205020404" pitchFamily="49" charset="0"/>
               </a:rPr>
-              <a:t>due to playback frequencies</a:t>
+              <a:t>playback timer </a:t>
+            </a:r>
+            <a:r>
+              <a:rPr lang="en-US" dirty="0" smtClean="0">
+                <a:cs typeface="Courier New" panose="02070309020205020404" pitchFamily="49" charset="0"/>
+              </a:rPr>
+              <a:t>discrepancies</a:t>
             </a:r>
             <a:endParaRPr lang="en-US" dirty="0">
               <a:cs typeface="Courier New" panose="02070309020205020404" pitchFamily="49" charset="0"/>
@@ -4231,6 +5112,13 @@
   <p:clrMapOvr>
     <a:masterClrMapping/>
   </p:clrMapOvr>
+  <p:timing>
+    <p:tnLst>
+      <p:par>
+        <p:cTn id="1" dur="indefinite" restart="never" nodeType="tmRoot"/>
+      </p:par>
+    </p:tnLst>
+  </p:timing>
 </p:sld>
 </file>
 
@@ -4300,7 +5188,18 @@
                 <a:ea typeface="+mj-ea"/>
                 <a:cs typeface="Arial"/>
               </a:rPr>
-              <a:t>VIDEO CORRECTIONS</a:t>
+              <a:t>VIDEO </a:t>
+            </a:r>
+            <a:r>
+              <a:rPr lang="en-US" sz="3200" b="1" dirty="0" smtClean="0">
+                <a:solidFill>
+                  <a:srgbClr val="990000"/>
+                </a:solidFill>
+                <a:latin typeface="Arial"/>
+                <a:ea typeface="+mj-ea"/>
+                <a:cs typeface="Arial"/>
+              </a:rPr>
+              <a:t>Summarization</a:t>
             </a:r>
             <a:r>
               <a:rPr kumimoji="0" lang="en-US" sz="4400" u="none" strike="noStrike" kern="1200" cap="none" spc="0" normalizeH="0" baseline="0" noProof="0" dirty="0" smtClean="0">
@@ -4350,171 +5249,9 @@
                 <a:ea typeface="+mj-ea"/>
                 <a:cs typeface="Arial"/>
               </a:rPr>
-              <a:t>Presentation Subtitle</a:t>
-            </a:r>
-          </a:p>
-        </p:txBody>
-      </p:sp>
-    </p:spTree>
-    <p:extLst>
-      <p:ext uri="{BB962C8B-B14F-4D97-AF65-F5344CB8AC3E}">
-        <p14:creationId xmlns:p14="http://schemas.microsoft.com/office/powerpoint/2010/main" val="742023582"/>
-      </p:ext>
-    </p:extLst>
-  </p:cSld>
-  <p:clrMapOvr>
-    <a:masterClrMapping/>
-  </p:clrMapOvr>
-</p:sld>
-</file>
-
-<file path=ppt/slides/slide6.xml><?xml version="1.0" encoding="utf-8"?>
-<p:sld xmlns:a="http://schemas.openxmlformats.org/drawingml/2006/main" xmlns:r="http://schemas.openxmlformats.org/officeDocument/2006/relationships" xmlns:p="http://schemas.openxmlformats.org/presentationml/2006/main">
-  <p:cSld>
-    <p:spTree>
-      <p:nvGrpSpPr>
-        <p:cNvPr id="1" name=""/>
-        <p:cNvGrpSpPr/>
-        <p:nvPr/>
-      </p:nvGrpSpPr>
-      <p:grpSpPr>
-        <a:xfrm>
-          <a:off x="0" y="0"/>
-          <a:ext cx="0" cy="0"/>
-          <a:chOff x="0" y="0"/>
-          <a:chExt cx="0" cy="0"/>
-        </a:xfrm>
-      </p:grpSpPr>
-      <p:pic>
-        <p:nvPicPr>
-          <p:cNvPr id="7171" name="Picture 3"/>
-          <p:cNvPicPr>
-            <a:picLocks noChangeAspect="1" noChangeArrowheads="1"/>
-          </p:cNvPicPr>
-          <p:nvPr/>
-        </p:nvPicPr>
-        <p:blipFill>
-          <a:blip r:embed="rId2">
-            <a:extLst>
-              <a:ext uri="{28A0092B-C50C-407E-A947-70E740481C1C}">
-                <a14:useLocalDpi xmlns:a14="http://schemas.microsoft.com/office/drawing/2010/main" val="0"/>
-              </a:ext>
-            </a:extLst>
-          </a:blip>
-          <a:srcRect/>
-          <a:stretch>
-            <a:fillRect/>
-          </a:stretch>
-        </p:blipFill>
-        <p:spPr bwMode="auto">
-          <a:xfrm>
-            <a:off x="5733229" y="2138754"/>
-            <a:ext cx="3135022" cy="2890446"/>
-          </a:xfrm>
-          <a:prstGeom prst="rect">
-            <a:avLst/>
-          </a:prstGeom>
-          <a:noFill/>
-          <a:ln>
-            <a:noFill/>
-          </a:ln>
-          <a:extLst>
-            <a:ext uri="{909E8E84-426E-40DD-AFC4-6F175D3DCCD1}">
-              <a14:hiddenFill xmlns:a14="http://schemas.microsoft.com/office/drawing/2010/main">
-                <a:solidFill>
-                  <a:schemeClr val="accent1"/>
-                </a:solidFill>
-              </a14:hiddenFill>
-            </a:ext>
-            <a:ext uri="{91240B29-F687-4F45-9708-019B960494DF}">
-              <a14:hiddenLine xmlns:a14="http://schemas.microsoft.com/office/drawing/2010/main" w="9525">
-                <a:solidFill>
-                  <a:schemeClr val="tx1"/>
-                </a:solidFill>
-                <a:miter lim="800000"/>
-                <a:headEnd/>
-                <a:tailEnd/>
-              </a14:hiddenLine>
-            </a:ext>
-          </a:extLst>
-        </p:spPr>
-      </p:pic>
-      <p:sp>
-        <p:nvSpPr>
-          <p:cNvPr id="2" name="Title 1"/>
-          <p:cNvSpPr txBox="1">
-            <a:spLocks/>
-          </p:cNvSpPr>
-          <p:nvPr/>
-        </p:nvSpPr>
-        <p:spPr>
-          <a:xfrm>
-            <a:off x="7350" y="5294"/>
-            <a:ext cx="9129299" cy="1432982"/>
-          </a:xfrm>
-          <a:prstGeom prst="rect">
-            <a:avLst/>
-          </a:prstGeom>
-        </p:spPr>
-        <p:txBody>
-          <a:bodyPr vert="horz" lIns="91440" tIns="45720" rIns="91440" bIns="45720" rtlCol="0" anchor="ctr">
-            <a:normAutofit/>
-          </a:bodyPr>
-          <a:lstStyle/>
-          <a:p>
-            <a:pPr lvl="0">
-              <a:spcBef>
-                <a:spcPct val="0"/>
-              </a:spcBef>
-              <a:defRPr/>
-            </a:pPr>
-            <a:r>
-              <a:rPr lang="en-US" sz="3200" b="1" dirty="0">
-                <a:solidFill>
-                  <a:srgbClr val="990000"/>
-                </a:solidFill>
-                <a:latin typeface="Arial"/>
-                <a:cs typeface="Arial"/>
-              </a:rPr>
-              <a:t>VIDEO CORRECTIONS</a:t>
-            </a:r>
-            <a:r>
-              <a:rPr lang="en-US" sz="4400" dirty="0">
-                <a:solidFill>
-                  <a:srgbClr val="990000"/>
-                </a:solidFill>
-                <a:latin typeface="Arial"/>
-                <a:cs typeface="Arial"/>
-              </a:rPr>
-              <a:t/>
-            </a:r>
-            <a:br>
-              <a:rPr lang="en-US" sz="4400" dirty="0">
-                <a:solidFill>
-                  <a:srgbClr val="990000"/>
-                </a:solidFill>
-                <a:latin typeface="Arial"/>
-                <a:cs typeface="Arial"/>
-              </a:rPr>
-            </a:br>
-            <a:r>
-              <a:rPr kumimoji="0" lang="en-US" sz="1400" u="none" strike="noStrike" kern="1200" cap="none" spc="0" normalizeH="0" baseline="0" noProof="0" dirty="0" smtClean="0">
-                <a:ln>
-                  <a:noFill/>
-                </a:ln>
-                <a:solidFill>
-                  <a:srgbClr val="990000"/>
-                </a:solidFill>
-                <a:effectLst/>
-                <a:uLnTx/>
-                <a:uFillTx/>
-                <a:latin typeface="Arial"/>
-                <a:ea typeface="+mj-ea"/>
-                <a:cs typeface="Arial"/>
-              </a:rPr>
-              <a:t>Motion Stabilization</a:t>
-            </a:r>
-            <a:endParaRPr kumimoji="0" lang="en-US" sz="1400" u="none" strike="noStrike" kern="1200" cap="none" spc="0" normalizeH="0" baseline="0" noProof="0" dirty="0" smtClean="0">
+              <a:t>Algorithm Design</a:t>
+            </a:r>
+            <a:endParaRPr kumimoji="0" lang="en-US" sz="2750" u="none" strike="noStrike" kern="1200" cap="none" spc="0" normalizeH="0" baseline="0" noProof="0" dirty="0" smtClean="0">
               <a:ln>
                 <a:noFill/>
               </a:ln>
@@ -4531,209 +5268,404 @@
           </a:p>
         </p:txBody>
       </p:sp>
-      <p:sp>
-        <p:nvSpPr>
-          <p:cNvPr id="3" name="TextBox 2"/>
-          <p:cNvSpPr txBox="1"/>
-          <p:nvPr/>
-        </p:nvSpPr>
-        <p:spPr>
-          <a:xfrm>
-            <a:off x="323849" y="1257300"/>
-            <a:ext cx="5723267" cy="4124206"/>
-          </a:xfrm>
-          <a:prstGeom prst="rect">
-            <a:avLst/>
-          </a:prstGeom>
-          <a:noFill/>
-        </p:spPr>
-        <p:txBody>
-          <a:bodyPr wrap="square" rtlCol="0">
-            <a:spAutoFit/>
-          </a:bodyPr>
-          <a:lstStyle/>
-          <a:p>
-            <a:pPr marL="285750" indent="-285750">
-              <a:buFont typeface="Arial" panose="020B0604020202020204" pitchFamily="34" charset="0"/>
-              <a:buChar char="•"/>
-            </a:pPr>
-            <a:r>
-              <a:rPr lang="en-US" sz="1600" dirty="0" smtClean="0"/>
-              <a:t>Using Computer Vision (CV) techniques (</a:t>
-            </a:r>
-            <a:r>
-              <a:rPr lang="en-US" sz="1600" dirty="0" err="1" smtClean="0"/>
-              <a:t>OpenCV</a:t>
-            </a:r>
-            <a:r>
-              <a:rPr lang="en-US" sz="1600" dirty="0" smtClean="0"/>
-              <a:t> 2.4.12)</a:t>
-            </a:r>
-          </a:p>
-          <a:p>
-            <a:pPr marL="742950" lvl="1" indent="-285750">
-              <a:buFont typeface="Arial" panose="020B0604020202020204" pitchFamily="34" charset="0"/>
-              <a:buChar char="•"/>
-            </a:pPr>
-            <a:r>
-              <a:rPr lang="en-US" sz="1600" dirty="0" smtClean="0"/>
-              <a:t>Convert Source Frame and Video Frames to Grayscale (single channel)</a:t>
-            </a:r>
-          </a:p>
-          <a:p>
-            <a:pPr marL="742950" lvl="1" indent="-285750">
-              <a:buFont typeface="Arial" panose="020B0604020202020204" pitchFamily="34" charset="0"/>
-              <a:buChar char="•"/>
-            </a:pPr>
-            <a:r>
-              <a:rPr lang="en-US" sz="1600" dirty="0"/>
-              <a:t>Detect Features using Speeded up robust features (SURF)</a:t>
-            </a:r>
-          </a:p>
-          <a:p>
-            <a:pPr marL="1200150" lvl="2" indent="-285750">
-              <a:buFont typeface="Arial" panose="020B0604020202020204" pitchFamily="34" charset="0"/>
-              <a:buChar char="•"/>
-            </a:pPr>
-            <a:r>
-              <a:rPr lang="en-US" sz="1600" dirty="0"/>
-              <a:t>Several times faster than SIFT</a:t>
-            </a:r>
-          </a:p>
-          <a:p>
-            <a:pPr marL="1200150" lvl="2" indent="-285750">
-              <a:buFont typeface="Arial" panose="020B0604020202020204" pitchFamily="34" charset="0"/>
-              <a:buChar char="•"/>
-            </a:pPr>
-            <a:r>
-              <a:rPr lang="en-US" sz="1600" dirty="0"/>
-              <a:t>Scale Invariant (Loss in Interpolation)</a:t>
-            </a:r>
-          </a:p>
-          <a:p>
-            <a:pPr marL="1200150" lvl="2" indent="-285750">
-              <a:buFont typeface="Arial" panose="020B0604020202020204" pitchFamily="34" charset="0"/>
-              <a:buChar char="•"/>
-            </a:pPr>
-            <a:r>
-              <a:rPr lang="en-US" sz="1600" dirty="0"/>
-              <a:t>Rotation Invariant</a:t>
-            </a:r>
-          </a:p>
-          <a:p>
-            <a:pPr marL="1200150" lvl="2" indent="-285750">
-              <a:buFont typeface="Arial" panose="020B0604020202020204" pitchFamily="34" charset="0"/>
-              <a:buChar char="•"/>
-            </a:pPr>
-            <a:r>
-              <a:rPr lang="en-US" sz="1600" dirty="0" smtClean="0"/>
-              <a:t>Using Region Of Interest (ROI) mask</a:t>
-            </a:r>
-          </a:p>
-          <a:p>
-            <a:pPr marL="742950" lvl="1" indent="-285750">
-              <a:buFont typeface="Arial" panose="020B0604020202020204" pitchFamily="34" charset="0"/>
-              <a:buChar char="•"/>
-            </a:pPr>
-            <a:r>
-              <a:rPr lang="en-US" sz="1600" dirty="0" smtClean="0"/>
-              <a:t>Extract Descriptors </a:t>
-            </a:r>
-            <a:r>
-              <a:rPr lang="en-US" sz="1600" dirty="0"/>
-              <a:t>(both Source and Video </a:t>
-            </a:r>
-            <a:r>
-              <a:rPr lang="en-US" sz="1600" dirty="0" smtClean="0"/>
-              <a:t>Frame)</a:t>
-            </a:r>
-            <a:endParaRPr lang="en-US" sz="1600" dirty="0"/>
-          </a:p>
-          <a:p>
-            <a:pPr marL="742950" lvl="1" indent="-285750">
-              <a:buFont typeface="Arial" panose="020B0604020202020204" pitchFamily="34" charset="0"/>
-              <a:buChar char="•"/>
-            </a:pPr>
-            <a:r>
-              <a:rPr lang="en-US" sz="1600" dirty="0" smtClean="0"/>
-              <a:t>Brute Force Match Descriptors (between Source and Video Frame)</a:t>
-            </a:r>
-          </a:p>
-          <a:p>
-            <a:pPr marL="742950" lvl="1" indent="-285750">
-              <a:buFont typeface="Arial" panose="020B0604020202020204" pitchFamily="34" charset="0"/>
-              <a:buChar char="•"/>
-            </a:pPr>
-            <a:r>
-              <a:rPr lang="en-US" sz="1600" dirty="0" smtClean="0"/>
-              <a:t>Remove Outliers</a:t>
-            </a:r>
-          </a:p>
-          <a:p>
-            <a:pPr marL="1200150" lvl="2" indent="-285750">
-              <a:buFont typeface="Arial" panose="020B0604020202020204" pitchFamily="34" charset="0"/>
-              <a:buChar char="•"/>
-            </a:pPr>
-            <a:r>
-              <a:rPr lang="en-US" sz="1600" dirty="0" smtClean="0"/>
-              <a:t>Ignore Features that have moved more than 9px</a:t>
-            </a:r>
-          </a:p>
-          <a:p>
-            <a:pPr marL="742950" lvl="1" indent="-285750">
-              <a:buFont typeface="Arial" panose="020B0604020202020204" pitchFamily="34" charset="0"/>
-              <a:buChar char="•"/>
-            </a:pPr>
-            <a:r>
-              <a:rPr lang="en-US" sz="1600" dirty="0" smtClean="0"/>
-              <a:t>Consider First 30 Good Features</a:t>
-            </a:r>
-          </a:p>
-          <a:p>
-            <a:pPr marL="742950" lvl="1" indent="-285750">
-              <a:buFont typeface="Arial" panose="020B0604020202020204" pitchFamily="34" charset="0"/>
-              <a:buChar char="•"/>
-            </a:pPr>
-            <a:r>
-              <a:rPr lang="en-US" sz="1600" dirty="0" smtClean="0"/>
-              <a:t>Compute </a:t>
-            </a:r>
-            <a:r>
-              <a:rPr lang="en-US" sz="1600" dirty="0" err="1" smtClean="0"/>
-              <a:t>Homography</a:t>
-            </a:r>
-            <a:r>
-              <a:rPr lang="en-US" sz="1600" dirty="0" smtClean="0"/>
-              <a:t> (Quad Projective Transformation)</a:t>
-            </a:r>
-          </a:p>
-          <a:p>
-            <a:pPr marL="742950" lvl="1" indent="-285750">
-              <a:buFont typeface="Arial" panose="020B0604020202020204" pitchFamily="34" charset="0"/>
-              <a:buChar char="•"/>
-            </a:pPr>
-            <a:r>
-              <a:rPr lang="en-US" sz="1600" dirty="0" smtClean="0"/>
-              <a:t>2D Transform Image </a:t>
-            </a:r>
-            <a:endParaRPr lang="en-US" sz="1600" dirty="0"/>
-          </a:p>
-        </p:txBody>
-      </p:sp>
+      <mc:AlternateContent xmlns:mc="http://schemas.openxmlformats.org/markup-compatibility/2006">
+        <mc:Choice xmlns:a14="http://schemas.microsoft.com/office/drawing/2010/main" Requires="a14">
+          <p:sp>
+            <p:nvSpPr>
+              <p:cNvPr id="3" name="TextBox 2"/>
+              <p:cNvSpPr txBox="1"/>
+              <p:nvPr/>
+            </p:nvSpPr>
+            <p:spPr>
+              <a:xfrm>
+                <a:off x="447674" y="1558272"/>
+                <a:ext cx="8248650" cy="2287165"/>
+              </a:xfrm>
+              <a:prstGeom prst="rect">
+                <a:avLst/>
+              </a:prstGeom>
+              <a:noFill/>
+            </p:spPr>
+            <p:txBody>
+              <a:bodyPr wrap="square" rtlCol="0">
+                <a:spAutoFit/>
+              </a:bodyPr>
+              <a:lstStyle/>
+              <a:p>
+                <a:pPr marL="285750" indent="-285750">
+                  <a:buFont typeface="Arial" panose="020B0604020202020204" pitchFamily="34" charset="0"/>
+                  <a:buChar char="•"/>
+                </a:pPr>
+                <a:r>
+                  <a:rPr lang="en-US" dirty="0" smtClean="0">
+                    <a:cs typeface="Courier New" panose="02070309020205020404" pitchFamily="49" charset="0"/>
+                  </a:rPr>
+                  <a:t>Uses </a:t>
+                </a:r>
+                <a:r>
+                  <a:rPr lang="en-US" dirty="0">
+                    <a:cs typeface="Courier New" panose="02070309020205020404" pitchFamily="49" charset="0"/>
+                  </a:rPr>
+                  <a:t>X</a:t>
+                </a:r>
+                <a:r>
+                  <a:rPr lang="en-US" dirty="0" smtClean="0">
+                    <a:cs typeface="Courier New" panose="02070309020205020404" pitchFamily="49" charset="0"/>
+                  </a:rPr>
+                  <a:t> Squared algorithm to generate distance based data.</a:t>
+                </a:r>
+              </a:p>
+              <a:p>
+                <a:pPr marL="742950" lvl="1" indent="-285750">
+                  <a:buFont typeface="Arial" panose="020B0604020202020204" pitchFamily="34" charset="0"/>
+                  <a:buChar char="•"/>
+                </a:pPr>
+                <a14:m>
+                  <m:oMath xmlns:m="http://schemas.openxmlformats.org/officeDocument/2006/math">
+                    <m:r>
+                      <a:rPr lang="en-US" b="0" i="1" smtClean="0">
+                        <a:latin typeface="Cambria Math"/>
+                        <a:cs typeface="Courier New" panose="02070309020205020404" pitchFamily="49" charset="0"/>
+                      </a:rPr>
+                      <m:t>𝑑</m:t>
+                    </m:r>
+                    <m:d>
+                      <m:dPr>
+                        <m:ctrlPr>
+                          <a:rPr lang="en-US" b="0" i="1" smtClean="0">
+                            <a:latin typeface="Cambria Math"/>
+                            <a:cs typeface="Courier New" panose="02070309020205020404" pitchFamily="49" charset="0"/>
+                          </a:rPr>
+                        </m:ctrlPr>
+                      </m:dPr>
+                      <m:e>
+                        <m:r>
+                          <a:rPr lang="en-US" b="0" i="1" smtClean="0">
+                            <a:latin typeface="Cambria Math"/>
+                            <a:cs typeface="Courier New" panose="02070309020205020404" pitchFamily="49" charset="0"/>
+                          </a:rPr>
+                          <m:t>𝑖</m:t>
+                        </m:r>
+                        <m:r>
+                          <a:rPr lang="en-US" b="0" i="1" smtClean="0">
+                            <a:latin typeface="Cambria Math"/>
+                            <a:cs typeface="Courier New" panose="02070309020205020404" pitchFamily="49" charset="0"/>
+                          </a:rPr>
+                          <m:t>,</m:t>
+                        </m:r>
+                        <m:r>
+                          <a:rPr lang="en-US" b="0" i="1" smtClean="0">
+                            <a:latin typeface="Cambria Math"/>
+                            <a:cs typeface="Courier New" panose="02070309020205020404" pitchFamily="49" charset="0"/>
+                          </a:rPr>
+                          <m:t>𝑗</m:t>
+                        </m:r>
+                      </m:e>
+                    </m:d>
+                    <m:r>
+                      <a:rPr lang="en-US" b="0" i="1" smtClean="0">
+                        <a:latin typeface="Cambria Math"/>
+                        <a:cs typeface="Courier New" panose="02070309020205020404" pitchFamily="49" charset="0"/>
+                      </a:rPr>
+                      <m:t>=</m:t>
+                    </m:r>
+                    <m:f>
+                      <m:fPr>
+                        <m:ctrlPr>
+                          <a:rPr lang="en-US" b="0" i="1" smtClean="0">
+                            <a:latin typeface="Cambria Math"/>
+                            <a:cs typeface="Courier New" panose="02070309020205020404" pitchFamily="49" charset="0"/>
+                          </a:rPr>
+                        </m:ctrlPr>
+                      </m:fPr>
+                      <m:num>
+                        <m:sSup>
+                          <m:sSupPr>
+                            <m:ctrlPr>
+                              <a:rPr lang="en-US" b="0" i="1" smtClean="0">
+                                <a:latin typeface="Cambria Math"/>
+                                <a:cs typeface="Courier New" panose="02070309020205020404" pitchFamily="49" charset="0"/>
+                              </a:rPr>
+                            </m:ctrlPr>
+                          </m:sSupPr>
+                          <m:e>
+                            <m:d>
+                              <m:dPr>
+                                <m:ctrlPr>
+                                  <a:rPr lang="en-US" b="0" i="1" smtClean="0">
+                                    <a:latin typeface="Cambria Math"/>
+                                    <a:cs typeface="Courier New" panose="02070309020205020404" pitchFamily="49" charset="0"/>
+                                  </a:rPr>
+                                </m:ctrlPr>
+                              </m:dPr>
+                              <m:e>
+                                <m:r>
+                                  <a:rPr lang="en-US" b="0" i="1" smtClean="0">
+                                    <a:latin typeface="Cambria Math"/>
+                                    <a:cs typeface="Courier New" panose="02070309020205020404" pitchFamily="49" charset="0"/>
+                                  </a:rPr>
+                                  <m:t>𝐹𝑟𝑎𝑚</m:t>
+                                </m:r>
+                                <m:sSub>
+                                  <m:sSubPr>
+                                    <m:ctrlPr>
+                                      <a:rPr lang="en-US" b="0" i="1" smtClean="0">
+                                        <a:latin typeface="Cambria Math"/>
+                                        <a:cs typeface="Courier New" panose="02070309020205020404" pitchFamily="49" charset="0"/>
+                                      </a:rPr>
+                                    </m:ctrlPr>
+                                  </m:sSubPr>
+                                  <m:e>
+                                    <m:r>
+                                      <a:rPr lang="en-US" b="0" i="1" smtClean="0">
+                                        <a:latin typeface="Cambria Math"/>
+                                        <a:cs typeface="Courier New" panose="02070309020205020404" pitchFamily="49" charset="0"/>
+                                      </a:rPr>
+                                      <m:t>𝑒</m:t>
+                                    </m:r>
+                                  </m:e>
+                                  <m:sub>
+                                    <m:r>
+                                      <a:rPr lang="en-US" b="0" i="1" smtClean="0">
+                                        <a:latin typeface="Cambria Math"/>
+                                        <a:cs typeface="Courier New" panose="02070309020205020404" pitchFamily="49" charset="0"/>
+                                      </a:rPr>
+                                      <m:t>𝑝𝑟𝑒𝑣</m:t>
+                                    </m:r>
+                                  </m:sub>
+                                </m:sSub>
+                                <m:r>
+                                  <a:rPr lang="en-US" b="0" i="1" smtClean="0">
+                                    <a:latin typeface="Cambria Math"/>
+                                    <a:cs typeface="Courier New" panose="02070309020205020404" pitchFamily="49" charset="0"/>
+                                  </a:rPr>
+                                  <m:t>−</m:t>
+                                </m:r>
+                                <m:r>
+                                  <a:rPr lang="en-US" b="0" i="1" smtClean="0">
+                                    <a:latin typeface="Cambria Math"/>
+                                    <a:cs typeface="Courier New" panose="02070309020205020404" pitchFamily="49" charset="0"/>
+                                  </a:rPr>
+                                  <m:t>𝐹𝑟𝑎𝑚</m:t>
+                                </m:r>
+                                <m:sSub>
+                                  <m:sSubPr>
+                                    <m:ctrlPr>
+                                      <a:rPr lang="en-US" b="0" i="1" smtClean="0">
+                                        <a:latin typeface="Cambria Math"/>
+                                        <a:cs typeface="Courier New" panose="02070309020205020404" pitchFamily="49" charset="0"/>
+                                      </a:rPr>
+                                    </m:ctrlPr>
+                                  </m:sSubPr>
+                                  <m:e>
+                                    <m:r>
+                                      <a:rPr lang="en-US" b="0" i="1" smtClean="0">
+                                        <a:latin typeface="Cambria Math"/>
+                                        <a:cs typeface="Courier New" panose="02070309020205020404" pitchFamily="49" charset="0"/>
+                                      </a:rPr>
+                                      <m:t>𝑒</m:t>
+                                    </m:r>
+                                  </m:e>
+                                  <m:sub>
+                                    <m:r>
+                                      <a:rPr lang="en-US" b="0" i="1" smtClean="0">
+                                        <a:latin typeface="Cambria Math"/>
+                                        <a:cs typeface="Courier New" panose="02070309020205020404" pitchFamily="49" charset="0"/>
+                                      </a:rPr>
+                                      <m:t>𝑐𝑢𝑟𝑟</m:t>
+                                    </m:r>
+                                  </m:sub>
+                                </m:sSub>
+                              </m:e>
+                            </m:d>
+                          </m:e>
+                          <m:sup>
+                            <m:r>
+                              <a:rPr lang="en-US" b="0" i="1" smtClean="0">
+                                <a:latin typeface="Cambria Math"/>
+                                <a:cs typeface="Courier New" panose="02070309020205020404" pitchFamily="49" charset="0"/>
+                              </a:rPr>
+                              <m:t>2</m:t>
+                            </m:r>
+                          </m:sup>
+                        </m:sSup>
+                      </m:num>
+                      <m:den>
+                        <m:r>
+                          <a:rPr lang="en-US" b="0" i="1" smtClean="0">
+                            <a:latin typeface="Cambria Math"/>
+                            <a:cs typeface="Courier New" panose="02070309020205020404" pitchFamily="49" charset="0"/>
+                          </a:rPr>
+                          <m:t>𝐹𝑟𝑎𝑚</m:t>
+                        </m:r>
+                        <m:sSub>
+                          <m:sSubPr>
+                            <m:ctrlPr>
+                              <a:rPr lang="en-US" b="0" i="1" smtClean="0">
+                                <a:latin typeface="Cambria Math"/>
+                                <a:cs typeface="Courier New" panose="02070309020205020404" pitchFamily="49" charset="0"/>
+                              </a:rPr>
+                            </m:ctrlPr>
+                          </m:sSubPr>
+                          <m:e>
+                            <m:r>
+                              <a:rPr lang="en-US" b="0" i="1" smtClean="0">
+                                <a:latin typeface="Cambria Math"/>
+                                <a:cs typeface="Courier New" panose="02070309020205020404" pitchFamily="49" charset="0"/>
+                              </a:rPr>
+                              <m:t>𝑒</m:t>
+                            </m:r>
+                          </m:e>
+                          <m:sub>
+                            <m:r>
+                              <a:rPr lang="en-US" b="0" i="1" smtClean="0">
+                                <a:latin typeface="Cambria Math"/>
+                                <a:cs typeface="Courier New" panose="02070309020205020404" pitchFamily="49" charset="0"/>
+                              </a:rPr>
+                              <m:t>𝑐𝑢𝑟𝑟</m:t>
+                            </m:r>
+                          </m:sub>
+                        </m:sSub>
+                      </m:den>
+                    </m:f>
+                  </m:oMath>
+                </a14:m>
+                <a:endParaRPr lang="en-US" dirty="0">
+                  <a:cs typeface="Courier New" panose="02070309020205020404" pitchFamily="49" charset="0"/>
+                </a:endParaRPr>
+              </a:p>
+              <a:p>
+                <a:pPr marL="285750" indent="-285750">
+                  <a:buFont typeface="Arial" panose="020B0604020202020204" pitchFamily="34" charset="0"/>
+                  <a:buChar char="•"/>
+                </a:pPr>
+                <a:endParaRPr lang="en-US" dirty="0" smtClean="0">
+                  <a:cs typeface="Courier New" panose="02070309020205020404" pitchFamily="49" charset="0"/>
+                </a:endParaRPr>
+              </a:p>
+              <a:p>
+                <a:pPr marL="742950" lvl="1" indent="-285750">
+                  <a:buFont typeface="Arial" panose="020B0604020202020204" pitchFamily="34" charset="0"/>
+                  <a:buChar char="•"/>
+                </a:pPr>
+                <a:r>
+                  <a:rPr lang="en-US" dirty="0" smtClean="0">
+                    <a:cs typeface="Courier New" panose="02070309020205020404" pitchFamily="49" charset="0"/>
+                  </a:rPr>
+                  <a:t>Distance threshold based on average + standard deviation calculation </a:t>
+                </a:r>
+                <a:r>
+                  <a:rPr lang="en-US" smtClean="0">
+                    <a:cs typeface="Courier New" panose="02070309020205020404" pitchFamily="49" charset="0"/>
+                  </a:rPr>
+                  <a:t>of data</a:t>
+                </a:r>
+              </a:p>
+              <a:p>
+                <a:pPr marL="742950" lvl="1" indent="-285750">
+                  <a:buFont typeface="Arial" panose="020B0604020202020204" pitchFamily="34" charset="0"/>
+                  <a:buChar char="•"/>
+                </a:pPr>
+                <a:endParaRPr lang="en-US" smtClean="0">
+                  <a:cs typeface="Courier New" panose="02070309020205020404" pitchFamily="49" charset="0"/>
+                </a:endParaRPr>
+              </a:p>
+              <a:p>
+                <a:pPr marL="285750" indent="-285750">
+                  <a:buFont typeface="Arial" panose="020B0604020202020204" pitchFamily="34" charset="0"/>
+                  <a:buChar char="•"/>
+                </a:pPr>
+                <a:r>
+                  <a:rPr lang="en-US" dirty="0" smtClean="0">
+                    <a:cs typeface="Courier New" panose="02070309020205020404" pitchFamily="49" charset="0"/>
+                  </a:rPr>
+                  <a:t>Better results compared to Euclidean distance and color histogram. </a:t>
+                </a:r>
+              </a:p>
+              <a:p>
+                <a:pPr marL="285750" indent="-285750">
+                  <a:buFont typeface="Arial" panose="020B0604020202020204" pitchFamily="34" charset="0"/>
+                  <a:buChar char="•"/>
+                </a:pPr>
+                <a:r>
+                  <a:rPr lang="en-US" dirty="0" smtClean="0">
+                    <a:cs typeface="Courier New" panose="02070309020205020404" pitchFamily="49" charset="0"/>
+                  </a:rPr>
+                  <a:t>Tried using entropy based metric, was not very robust.</a:t>
+                </a:r>
+                <a:r>
+                  <a:rPr lang="en-US" dirty="0" smtClean="0">
+                    <a:cs typeface="Courier New" panose="02070309020205020404" pitchFamily="49" charset="0"/>
+                  </a:rPr>
+                  <a:t>  </a:t>
+                </a:r>
+                <a:endParaRPr lang="en-US" dirty="0">
+                  <a:cs typeface="Courier New" panose="02070309020205020404" pitchFamily="49" charset="0"/>
+                </a:endParaRPr>
+              </a:p>
+            </p:txBody>
+          </p:sp>
+        </mc:Choice>
+        <mc:Fallback>
+          <p:sp>
+            <p:nvSpPr>
+              <p:cNvPr id="3" name="TextBox 2"/>
+              <p:cNvSpPr txBox="1">
+                <a:spLocks noRot="1" noChangeAspect="1" noMove="1" noResize="1" noEditPoints="1" noAdjustHandles="1" noChangeArrowheads="1" noChangeShapeType="1" noTextEdit="1"/>
+              </p:cNvSpPr>
+              <p:nvPr/>
+            </p:nvSpPr>
+            <p:spPr>
+              <a:xfrm>
+                <a:off x="447674" y="1558272"/>
+                <a:ext cx="8248650" cy="2287165"/>
+              </a:xfrm>
+              <a:prstGeom prst="rect">
+                <a:avLst/>
+              </a:prstGeom>
+              <a:blipFill rotWithShape="1">
+                <a:blip r:embed="rId2"/>
+                <a:stretch>
+                  <a:fillRect l="-443" t="-1333" b="-3467"/>
+                </a:stretch>
+              </a:blipFill>
+            </p:spPr>
+            <p:txBody>
+              <a:bodyPr/>
+              <a:lstStyle/>
+              <a:p>
+                <a:r>
+                  <a:rPr lang="en-US">
+                    <a:noFill/>
+                  </a:rPr>
+                  <a:t> </a:t>
+                </a:r>
+              </a:p>
+            </p:txBody>
+          </p:sp>
+        </mc:Fallback>
+      </mc:AlternateContent>
     </p:spTree>
     <p:extLst>
       <p:ext uri="{BB962C8B-B14F-4D97-AF65-F5344CB8AC3E}">
-        <p14:creationId xmlns:p14="http://schemas.microsoft.com/office/powerpoint/2010/main" val="3371719288"/>
+        <p14:creationId xmlns:p14="http://schemas.microsoft.com/office/powerpoint/2010/main" val="742023582"/>
       </p:ext>
     </p:extLst>
   </p:cSld>
   <p:clrMapOvr>
     <a:masterClrMapping/>
   </p:clrMapOvr>
+  <p:timing>
+    <p:tnLst>
+      <p:par>
+        <p:cTn id="1" dur="indefinite" restart="never" nodeType="tmRoot"/>
+      </p:par>
+    </p:tnLst>
+  </p:timing>
 </p:sld>
 </file>
 
-<file path=ppt/slides/slide7.xml><?xml version="1.0" encoding="utf-8"?>
+<file path=ppt/slides/slide6.xml><?xml version="1.0" encoding="utf-8"?>
 <p:sld xmlns:a="http://schemas.openxmlformats.org/drawingml/2006/main" xmlns:r="http://schemas.openxmlformats.org/officeDocument/2006/relationships" xmlns:p="http://schemas.openxmlformats.org/presentationml/2006/main">
   <p:cSld>
     <p:spTree>
@@ -4851,167 +5783,244 @@
           </a:p>
         </p:txBody>
       </p:sp>
-      <p:sp>
-        <p:nvSpPr>
-          <p:cNvPr id="3" name="TextBox 2"/>
-          <p:cNvSpPr txBox="1"/>
-          <p:nvPr/>
-        </p:nvSpPr>
-        <p:spPr>
-          <a:xfrm>
-            <a:off x="323850" y="1714500"/>
-            <a:ext cx="8410575" cy="3416320"/>
-          </a:xfrm>
-          <a:prstGeom prst="rect">
-            <a:avLst/>
-          </a:prstGeom>
-          <a:noFill/>
-        </p:spPr>
-        <p:txBody>
-          <a:bodyPr wrap="square" rtlCol="0">
-            <a:spAutoFit/>
-          </a:bodyPr>
-          <a:lstStyle/>
-          <a:p>
-            <a:pPr marL="285750" indent="-285750">
-              <a:buFont typeface="Arial" panose="020B0604020202020204" pitchFamily="34" charset="0"/>
-              <a:buChar char="•"/>
-            </a:pPr>
-            <a:r>
-              <a:rPr lang="en-US" dirty="0" smtClean="0"/>
-              <a:t>Using Computer Vision (CV) techniques</a:t>
-            </a:r>
-          </a:p>
-          <a:p>
-            <a:pPr marL="742950" lvl="1" indent="-285750">
-              <a:buFont typeface="Arial" panose="020B0604020202020204" pitchFamily="34" charset="0"/>
-              <a:buChar char="•"/>
-            </a:pPr>
-            <a:r>
-              <a:rPr lang="en-US" dirty="0" smtClean="0"/>
-              <a:t>Resize Source image using Bilinear Interpolation</a:t>
-            </a:r>
-          </a:p>
-          <a:p>
-            <a:pPr marL="742950" lvl="1" indent="-285750">
-              <a:buFont typeface="Arial" panose="020B0604020202020204" pitchFamily="34" charset="0"/>
-              <a:buChar char="•"/>
-            </a:pPr>
-            <a:r>
-              <a:rPr lang="en-US" dirty="0" smtClean="0"/>
-              <a:t>Convert Source Frame and Video Frames to Grayscale (single channel)</a:t>
-            </a:r>
-          </a:p>
-          <a:p>
-            <a:pPr marL="1200150" lvl="2" indent="-285750">
-              <a:buFont typeface="Arial" panose="020B0604020202020204" pitchFamily="34" charset="0"/>
-              <a:buChar char="•"/>
-            </a:pPr>
-            <a:r>
-              <a:rPr lang="en-US" dirty="0" smtClean="0"/>
-              <a:t>Color Invariant</a:t>
-            </a:r>
-          </a:p>
-          <a:p>
-            <a:pPr marL="742950" lvl="1" indent="-285750">
-              <a:buFont typeface="Arial" panose="020B0604020202020204" pitchFamily="34" charset="0"/>
-              <a:buChar char="•"/>
-            </a:pPr>
-            <a:r>
-              <a:rPr lang="en-US" dirty="0" smtClean="0"/>
-              <a:t>Detect Features using </a:t>
-            </a:r>
-            <a:r>
-              <a:rPr lang="en-US" dirty="0"/>
-              <a:t>Speeded up robust </a:t>
-            </a:r>
-            <a:r>
-              <a:rPr lang="en-US" dirty="0" smtClean="0"/>
-              <a:t>features (SURF)</a:t>
-            </a:r>
-          </a:p>
-          <a:p>
-            <a:pPr marL="1200150" lvl="2" indent="-285750">
-              <a:buFont typeface="Arial" panose="020B0604020202020204" pitchFamily="34" charset="0"/>
-              <a:buChar char="•"/>
-            </a:pPr>
-            <a:r>
-              <a:rPr lang="en-US" dirty="0" smtClean="0"/>
-              <a:t>Several times faster than SIFT</a:t>
-            </a:r>
-          </a:p>
-          <a:p>
-            <a:pPr marL="1200150" lvl="2" indent="-285750">
-              <a:buFont typeface="Arial" panose="020B0604020202020204" pitchFamily="34" charset="0"/>
-              <a:buChar char="•"/>
-            </a:pPr>
-            <a:r>
-              <a:rPr lang="en-US" dirty="0" smtClean="0"/>
-              <a:t>Scale Invariant (Loss in Interpolation)</a:t>
-            </a:r>
-          </a:p>
-          <a:p>
-            <a:pPr marL="1200150" lvl="2" indent="-285750">
-              <a:buFont typeface="Arial" panose="020B0604020202020204" pitchFamily="34" charset="0"/>
-              <a:buChar char="•"/>
-            </a:pPr>
-            <a:r>
-              <a:rPr lang="en-US" dirty="0" smtClean="0"/>
-              <a:t>Rotation Invariant</a:t>
-            </a:r>
-          </a:p>
-          <a:p>
-            <a:pPr marL="742950" lvl="1" indent="-285750">
-              <a:buFont typeface="Arial" panose="020B0604020202020204" pitchFamily="34" charset="0"/>
-              <a:buChar char="•"/>
-            </a:pPr>
-            <a:r>
-              <a:rPr lang="en-US" dirty="0" smtClean="0"/>
-              <a:t>Extract Descriptors </a:t>
-            </a:r>
-            <a:r>
-              <a:rPr lang="en-US" dirty="0"/>
-              <a:t>(both Source and Video </a:t>
-            </a:r>
-            <a:r>
-              <a:rPr lang="en-US" dirty="0" smtClean="0"/>
-              <a:t>Frame)</a:t>
-            </a:r>
-            <a:endParaRPr lang="en-US" dirty="0"/>
-          </a:p>
-          <a:p>
-            <a:pPr marL="742950" lvl="1" indent="-285750">
-              <a:buFont typeface="Arial" panose="020B0604020202020204" pitchFamily="34" charset="0"/>
-              <a:buChar char="•"/>
-            </a:pPr>
-            <a:r>
-              <a:rPr lang="en-US" dirty="0" smtClean="0"/>
-              <a:t>Brute Force Match Descriptors (between Source and Video Frame)</a:t>
-            </a:r>
-          </a:p>
-          <a:p>
-            <a:pPr marL="742950" lvl="1" indent="-285750">
-              <a:buFont typeface="Arial" panose="020B0604020202020204" pitchFamily="34" charset="0"/>
-              <a:buChar char="•"/>
-            </a:pPr>
-            <a:r>
-              <a:rPr lang="en-US" dirty="0" smtClean="0"/>
-              <a:t>Remove Outliers</a:t>
-            </a:r>
-          </a:p>
-          <a:p>
-            <a:pPr marL="1200150" lvl="2" indent="-285750">
-              <a:buFont typeface="Arial" panose="020B0604020202020204" pitchFamily="34" charset="0"/>
-              <a:buChar char="•"/>
-            </a:pPr>
-            <a:r>
-              <a:rPr lang="en-US" dirty="0" smtClean="0"/>
-              <a:t>Ignore Features that have moved more than 1px</a:t>
-            </a:r>
-            <a:endParaRPr lang="en-US" dirty="0"/>
-          </a:p>
-        </p:txBody>
-      </p:sp>
+      <mc:AlternateContent xmlns:mc="http://schemas.openxmlformats.org/markup-compatibility/2006">
+        <mc:Choice xmlns:a14="http://schemas.microsoft.com/office/drawing/2010/main" Requires="a14">
+          <p:sp>
+            <p:nvSpPr>
+              <p:cNvPr id="3" name="TextBox 2"/>
+              <p:cNvSpPr txBox="1"/>
+              <p:nvPr/>
+            </p:nvSpPr>
+            <p:spPr>
+              <a:xfrm>
+                <a:off x="323850" y="1714500"/>
+                <a:ext cx="8410575" cy="3178242"/>
+              </a:xfrm>
+              <a:prstGeom prst="rect">
+                <a:avLst/>
+              </a:prstGeom>
+              <a:noFill/>
+            </p:spPr>
+            <p:txBody>
+              <a:bodyPr wrap="square" rtlCol="0">
+                <a:spAutoFit/>
+              </a:bodyPr>
+              <a:lstStyle/>
+              <a:p>
+                <a:pPr marL="285750" indent="-285750">
+                  <a:buFont typeface="Arial" panose="020B0604020202020204" pitchFamily="34" charset="0"/>
+                  <a:buChar char="•"/>
+                </a:pPr>
+                <a:r>
+                  <a:rPr lang="en-US" dirty="0" smtClean="0"/>
+                  <a:t>Using Computer Vision (CV) techniques</a:t>
+                </a:r>
+              </a:p>
+              <a:p>
+                <a:pPr marL="742950" lvl="1" indent="-285750">
+                  <a:buFont typeface="Arial" panose="020B0604020202020204" pitchFamily="34" charset="0"/>
+                  <a:buChar char="•"/>
+                </a:pPr>
+                <a:r>
+                  <a:rPr lang="en-US" dirty="0" smtClean="0"/>
+                  <a:t>Resize Source image using Bilinear Interpolation</a:t>
+                </a:r>
+              </a:p>
+              <a:p>
+                <a:pPr marL="742950" lvl="1" indent="-285750">
+                  <a:buFont typeface="Arial" panose="020B0604020202020204" pitchFamily="34" charset="0"/>
+                  <a:buChar char="•"/>
+                </a:pPr>
+                <a:r>
+                  <a:rPr lang="en-US" dirty="0" smtClean="0"/>
+                  <a:t>Convert Source Frame and Video Frames to Grayscale (single channel)</a:t>
+                </a:r>
+              </a:p>
+              <a:p>
+                <a:pPr marL="742950" lvl="1" indent="-285750">
+                  <a:buFont typeface="Arial" panose="020B0604020202020204" pitchFamily="34" charset="0"/>
+                  <a:buChar char="•"/>
+                </a:pPr>
+                <a:r>
+                  <a:rPr lang="en-US" dirty="0" smtClean="0"/>
+                  <a:t>Detect </a:t>
+                </a:r>
+                <a:r>
+                  <a:rPr lang="en-US" dirty="0" smtClean="0"/>
+                  <a:t>Features using </a:t>
+                </a:r>
+                <a:r>
+                  <a:rPr lang="en-US" dirty="0"/>
+                  <a:t>Speeded </a:t>
+                </a:r>
+                <a:r>
+                  <a:rPr lang="en-US" dirty="0" smtClean="0"/>
+                  <a:t>Up Robust Features </a:t>
+                </a:r>
+                <a:r>
+                  <a:rPr lang="en-US" dirty="0" smtClean="0"/>
+                  <a:t>(</a:t>
+                </a:r>
+                <a:r>
+                  <a:rPr lang="en-US" dirty="0" smtClean="0"/>
+                  <a:t>SURF 64)</a:t>
+                </a:r>
+                <a:endParaRPr lang="en-US" dirty="0" smtClean="0"/>
+              </a:p>
+              <a:p>
+                <a:pPr marL="1200150" lvl="2" indent="-285750">
+                  <a:buFont typeface="Arial" panose="020B0604020202020204" pitchFamily="34" charset="0"/>
+                  <a:buChar char="•"/>
+                </a:pPr>
+                <a:r>
+                  <a:rPr lang="en-US" dirty="0" smtClean="0"/>
+                  <a:t>Several times faster than SIFT</a:t>
+                </a:r>
+              </a:p>
+              <a:p>
+                <a:pPr marL="1200150" lvl="2" indent="-285750">
+                  <a:buFont typeface="Arial" panose="020B0604020202020204" pitchFamily="34" charset="0"/>
+                  <a:buChar char="•"/>
+                </a:pPr>
+                <a:r>
+                  <a:rPr lang="en-US" dirty="0" smtClean="0"/>
+                  <a:t>Scale Invariant (Loss in Interpolation)</a:t>
+                </a:r>
+              </a:p>
+              <a:p>
+                <a:pPr marL="1200150" lvl="2" indent="-285750">
+                  <a:buFont typeface="Arial" panose="020B0604020202020204" pitchFamily="34" charset="0"/>
+                  <a:buChar char="•"/>
+                </a:pPr>
+                <a:r>
+                  <a:rPr lang="en-US" dirty="0" smtClean="0"/>
+                  <a:t>Rotation </a:t>
+                </a:r>
+                <a:r>
+                  <a:rPr lang="en-US" dirty="0" smtClean="0"/>
+                  <a:t>Invariant (Examples were fixed)</a:t>
+                </a:r>
+                <a:endParaRPr lang="en-US" dirty="0" smtClean="0"/>
+              </a:p>
+              <a:p>
+                <a:pPr marL="742950" lvl="1" indent="-285750">
+                  <a:buFont typeface="Arial" panose="020B0604020202020204" pitchFamily="34" charset="0"/>
+                  <a:buChar char="•"/>
+                </a:pPr>
+                <a:r>
+                  <a:rPr lang="en-US" dirty="0" smtClean="0"/>
+                  <a:t>Extract Descriptors </a:t>
+                </a:r>
+                <a:r>
+                  <a:rPr lang="en-US" dirty="0"/>
+                  <a:t>(both Source and Video </a:t>
+                </a:r>
+                <a:r>
+                  <a:rPr lang="en-US" dirty="0" smtClean="0"/>
+                  <a:t>Frame)</a:t>
+                </a:r>
+                <a:endParaRPr lang="en-US" dirty="0"/>
+              </a:p>
+              <a:p>
+                <a:pPr marL="742950" lvl="1" indent="-285750">
+                  <a:buFont typeface="Arial" panose="020B0604020202020204" pitchFamily="34" charset="0"/>
+                  <a:buChar char="•"/>
+                </a:pPr>
+                <a:r>
+                  <a:rPr lang="en-US" dirty="0" smtClean="0"/>
+                  <a:t>Brute Force Match Descriptors (between Source and Video Frame)</a:t>
+                </a:r>
+              </a:p>
+              <a:p>
+                <a:pPr marL="742950" lvl="1" indent="-285750">
+                  <a:buFont typeface="Arial" panose="020B0604020202020204" pitchFamily="34" charset="0"/>
+                  <a:buChar char="•"/>
+                </a:pPr>
+                <a:r>
+                  <a:rPr lang="en-US" dirty="0" smtClean="0"/>
+                  <a:t>Remove Outliers</a:t>
+                </a:r>
+              </a:p>
+              <a:p>
+                <a:pPr marL="1200150" lvl="2" indent="-285750">
+                  <a:buFont typeface="Arial" panose="020B0604020202020204" pitchFamily="34" charset="0"/>
+                  <a:buChar char="•"/>
+                </a:pPr>
+                <a:r>
+                  <a:rPr lang="en-US" dirty="0" smtClean="0"/>
+                  <a:t>Ignore Features that have moved more than </a:t>
+                </a:r>
+                <a:r>
+                  <a:rPr lang="en-US" dirty="0" smtClean="0"/>
+                  <a:t>distance </a:t>
+                </a:r>
+                <a14:m>
+                  <m:oMath xmlns:m="http://schemas.openxmlformats.org/officeDocument/2006/math">
+                    <m:rad>
+                      <m:radPr>
+                        <m:degHide m:val="on"/>
+                        <m:ctrlPr>
+                          <a:rPr lang="en-US" i="1" dirty="0" smtClean="0">
+                            <a:latin typeface="Cambria Math"/>
+                          </a:rPr>
+                        </m:ctrlPr>
+                      </m:radPr>
+                      <m:deg/>
+                      <m:e>
+                        <m:r>
+                          <a:rPr lang="en-US" b="0" i="1" dirty="0" smtClean="0">
+                            <a:latin typeface="Cambria Math"/>
+                          </a:rPr>
+                          <m:t>2</m:t>
+                        </m:r>
+                      </m:e>
+                    </m:rad>
+                  </m:oMath>
+                </a14:m>
+                <a:endParaRPr lang="en-US" dirty="0"/>
+              </a:p>
+            </p:txBody>
+          </p:sp>
+        </mc:Choice>
+        <mc:Fallback>
+          <p:sp>
+            <p:nvSpPr>
+              <p:cNvPr id="3" name="TextBox 2"/>
+              <p:cNvSpPr txBox="1">
+                <a:spLocks noRot="1" noChangeAspect="1" noMove="1" noResize="1" noEditPoints="1" noAdjustHandles="1" noChangeArrowheads="1" noChangeShapeType="1" noTextEdit="1"/>
+              </p:cNvSpPr>
+              <p:nvPr/>
+            </p:nvSpPr>
+            <p:spPr>
+              <a:xfrm>
+                <a:off x="323850" y="1714500"/>
+                <a:ext cx="8410575" cy="3178242"/>
+              </a:xfrm>
+              <a:prstGeom prst="rect">
+                <a:avLst/>
+              </a:prstGeom>
+              <a:blipFill rotWithShape="1">
+                <a:blip r:embed="rId2"/>
+                <a:stretch>
+                  <a:fillRect l="-435" t="-958" b="-1724"/>
+                </a:stretch>
+              </a:blipFill>
+            </p:spPr>
+            <p:txBody>
+              <a:bodyPr/>
+              <a:lstStyle/>
+              <a:p>
+                <a:r>
+                  <a:rPr lang="en-US">
+                    <a:noFill/>
+                  </a:rPr>
+                  <a:t> </a:t>
+                </a:r>
+              </a:p>
+            </p:txBody>
+          </p:sp>
+        </mc:Fallback>
+      </mc:AlternateContent>
     </p:spTree>
     <p:extLst>
       <p:ext uri="{BB962C8B-B14F-4D97-AF65-F5344CB8AC3E}">
@@ -5022,10 +6031,17 @@
   <p:clrMapOvr>
     <a:masterClrMapping/>
   </p:clrMapOvr>
+  <p:timing>
+    <p:tnLst>
+      <p:par>
+        <p:cTn id="1" dur="indefinite" restart="never" nodeType="tmRoot"/>
+      </p:par>
+    </p:tnLst>
+  </p:timing>
 </p:sld>
 </file>
 
-<file path=ppt/slides/slide8.xml><?xml version="1.0" encoding="utf-8"?>
+<file path=ppt/slides/slide7.xml><?xml version="1.0" encoding="utf-8"?>
 <p:sld xmlns:a="http://schemas.openxmlformats.org/drawingml/2006/main" xmlns:r="http://schemas.openxmlformats.org/officeDocument/2006/relationships" xmlns:p="http://schemas.openxmlformats.org/presentationml/2006/main">
   <p:cSld>
     <p:spTree>
@@ -5308,10 +6324,17 @@
   <p:clrMapOvr>
     <a:masterClrMapping/>
   </p:clrMapOvr>
+  <p:timing>
+    <p:tnLst>
+      <p:par>
+        <p:cTn id="1" dur="indefinite" restart="never" nodeType="tmRoot"/>
+      </p:par>
+    </p:tnLst>
+  </p:timing>
 </p:sld>
 </file>
 
-<file path=ppt/slides/slide9.xml><?xml version="1.0" encoding="utf-8"?>
+<file path=ppt/slides/slide8.xml><?xml version="1.0" encoding="utf-8"?>
 <p:sld xmlns:a="http://schemas.openxmlformats.org/drawingml/2006/main" xmlns:r="http://schemas.openxmlformats.org/officeDocument/2006/relationships" xmlns:p="http://schemas.openxmlformats.org/presentationml/2006/main">
   <p:cSld>
     <p:spTree>
@@ -5587,6 +6610,299 @@
   <p:clrMapOvr>
     <a:masterClrMapping/>
   </p:clrMapOvr>
+  <p:timing>
+    <p:tnLst>
+      <p:par>
+        <p:cTn id="1" dur="indefinite" restart="never" nodeType="tmRoot"/>
+      </p:par>
+    </p:tnLst>
+  </p:timing>
+</p:sld>
+</file>
+
+<file path=ppt/slides/slide9.xml><?xml version="1.0" encoding="utf-8"?>
+<p:sld xmlns:a="http://schemas.openxmlformats.org/drawingml/2006/main" xmlns:r="http://schemas.openxmlformats.org/officeDocument/2006/relationships" xmlns:p="http://schemas.openxmlformats.org/presentationml/2006/main">
+  <p:cSld>
+    <p:spTree>
+      <p:nvGrpSpPr>
+        <p:cNvPr id="1" name=""/>
+        <p:cNvGrpSpPr/>
+        <p:nvPr/>
+      </p:nvGrpSpPr>
+      <p:grpSpPr>
+        <a:xfrm>
+          <a:off x="0" y="0"/>
+          <a:ext cx="0" cy="0"/>
+          <a:chOff x="0" y="0"/>
+          <a:chExt cx="0" cy="0"/>
+        </a:xfrm>
+      </p:grpSpPr>
+      <p:sp>
+        <p:nvSpPr>
+          <p:cNvPr id="2" name="Title 1"/>
+          <p:cNvSpPr txBox="1">
+            <a:spLocks/>
+          </p:cNvSpPr>
+          <p:nvPr/>
+        </p:nvSpPr>
+        <p:spPr>
+          <a:xfrm>
+            <a:off x="7350" y="5294"/>
+            <a:ext cx="9129299" cy="1432982"/>
+          </a:xfrm>
+          <a:prstGeom prst="rect">
+            <a:avLst/>
+          </a:prstGeom>
+        </p:spPr>
+        <p:txBody>
+          <a:bodyPr vert="horz" lIns="91440" tIns="45720" rIns="91440" bIns="45720" rtlCol="0" anchor="ctr">
+            <a:normAutofit/>
+          </a:bodyPr>
+          <a:lstStyle/>
+          <a:p>
+            <a:pPr lvl="0">
+              <a:spcBef>
+                <a:spcPct val="0"/>
+              </a:spcBef>
+              <a:defRPr/>
+            </a:pPr>
+            <a:r>
+              <a:rPr lang="en-US" sz="3200" b="1" dirty="0" smtClean="0">
+                <a:solidFill>
+                  <a:srgbClr val="990000"/>
+                </a:solidFill>
+                <a:latin typeface="Arial"/>
+                <a:ea typeface="+mj-ea"/>
+                <a:cs typeface="Arial"/>
+              </a:rPr>
+              <a:t>VIDEO INDEXING</a:t>
+            </a:r>
+            <a:r>
+              <a:rPr kumimoji="0" lang="en-US" sz="4400" u="none" strike="noStrike" kern="1200" cap="none" spc="0" normalizeH="0" baseline="0" noProof="0" dirty="0" smtClean="0">
+                <a:ln>
+                  <a:noFill/>
+                </a:ln>
+                <a:solidFill>
+                  <a:srgbClr val="990000"/>
+                </a:solidFill>
+                <a:effectLst/>
+                <a:uLnTx/>
+                <a:uFillTx/>
+                <a:latin typeface="Arial"/>
+                <a:ea typeface="+mj-ea"/>
+                <a:cs typeface="Arial"/>
+              </a:rPr>
+              <a:t/>
+            </a:r>
+            <a:br>
+              <a:rPr kumimoji="0" lang="en-US" sz="4400" u="none" strike="noStrike" kern="1200" cap="none" spc="0" normalizeH="0" baseline="0" noProof="0" dirty="0" smtClean="0">
+                <a:ln>
+                  <a:noFill/>
+                </a:ln>
+                <a:solidFill>
+                  <a:srgbClr val="990000"/>
+                </a:solidFill>
+                <a:effectLst/>
+                <a:uLnTx/>
+                <a:uFillTx/>
+                <a:latin typeface="Arial"/>
+                <a:ea typeface="+mj-ea"/>
+                <a:cs typeface="Arial"/>
+              </a:rPr>
+            </a:br>
+            <a:r>
+              <a:rPr lang="en-US" sz="1400" dirty="0">
+                <a:solidFill>
+                  <a:srgbClr val="990000"/>
+                </a:solidFill>
+                <a:latin typeface="Arial"/>
+                <a:cs typeface="Arial"/>
+              </a:rPr>
+              <a:t>Results </a:t>
+            </a:r>
+            <a:r>
+              <a:rPr lang="en-US" sz="1400" dirty="0" smtClean="0">
+                <a:solidFill>
+                  <a:srgbClr val="990000"/>
+                </a:solidFill>
+                <a:latin typeface="Arial"/>
+                <a:ea typeface="+mj-ea"/>
+                <a:cs typeface="Arial"/>
+              </a:rPr>
+              <a:t>Alin_Day1_002\16700.png</a:t>
+            </a:r>
+            <a:endParaRPr kumimoji="0" lang="en-US" sz="1400" u="none" strike="noStrike" kern="1200" cap="none" spc="0" normalizeH="0" baseline="0" noProof="0" dirty="0" smtClean="0">
+              <a:ln>
+                <a:noFill/>
+              </a:ln>
+              <a:solidFill>
+                <a:srgbClr val="990000"/>
+              </a:solidFill>
+              <a:effectLst/>
+              <a:uLnTx/>
+              <a:uFillTx/>
+              <a:latin typeface="Arial"/>
+              <a:ea typeface="+mj-ea"/>
+              <a:cs typeface="Arial"/>
+            </a:endParaRPr>
+          </a:p>
+        </p:txBody>
+      </p:sp>
+      <p:pic>
+        <p:nvPicPr>
+          <p:cNvPr id="4098" name="Picture 2"/>
+          <p:cNvPicPr>
+            <a:picLocks noChangeAspect="1" noChangeArrowheads="1"/>
+          </p:cNvPicPr>
+          <p:nvPr/>
+        </p:nvPicPr>
+        <p:blipFill>
+          <a:blip r:embed="rId2">
+            <a:extLst>
+              <a:ext uri="{28A0092B-C50C-407E-A947-70E740481C1C}">
+                <a14:useLocalDpi xmlns:a14="http://schemas.microsoft.com/office/drawing/2010/main" val="0"/>
+              </a:ext>
+            </a:extLst>
+          </a:blip>
+          <a:srcRect/>
+          <a:stretch>
+            <a:fillRect/>
+          </a:stretch>
+        </p:blipFill>
+        <p:spPr bwMode="auto">
+          <a:xfrm>
+            <a:off x="4872038" y="1528762"/>
+            <a:ext cx="3700461" cy="2994896"/>
+          </a:xfrm>
+          <a:prstGeom prst="rect">
+            <a:avLst/>
+          </a:prstGeom>
+          <a:noFill/>
+          <a:ln>
+            <a:noFill/>
+          </a:ln>
+          <a:extLst>
+            <a:ext uri="{909E8E84-426E-40DD-AFC4-6F175D3DCCD1}">
+              <a14:hiddenFill xmlns:a14="http://schemas.microsoft.com/office/drawing/2010/main">
+                <a:solidFill>
+                  <a:schemeClr val="accent1"/>
+                </a:solidFill>
+              </a14:hiddenFill>
+            </a:ext>
+            <a:ext uri="{91240B29-F687-4F45-9708-019B960494DF}">
+              <a14:hiddenLine xmlns:a14="http://schemas.microsoft.com/office/drawing/2010/main" w="9525">
+                <a:solidFill>
+                  <a:schemeClr val="tx1"/>
+                </a:solidFill>
+                <a:miter lim="800000"/>
+                <a:headEnd/>
+                <a:tailEnd/>
+              </a14:hiddenLine>
+            </a:ext>
+          </a:extLst>
+        </p:spPr>
+      </p:pic>
+      <p:sp>
+        <p:nvSpPr>
+          <p:cNvPr id="3" name="TextBox 2"/>
+          <p:cNvSpPr txBox="1"/>
+          <p:nvPr/>
+        </p:nvSpPr>
+        <p:spPr>
+          <a:xfrm>
+            <a:off x="4872038" y="4867275"/>
+            <a:ext cx="3005137" cy="369332"/>
+          </a:xfrm>
+          <a:prstGeom prst="rect">
+            <a:avLst/>
+          </a:prstGeom>
+          <a:noFill/>
+        </p:spPr>
+        <p:txBody>
+          <a:bodyPr wrap="square" rtlCol="0">
+            <a:spAutoFit/>
+          </a:bodyPr>
+          <a:lstStyle/>
+          <a:p>
+            <a:r>
+              <a:rPr lang="en-US" dirty="0" smtClean="0"/>
+              <a:t>Frame: 3306 (34 Matches)</a:t>
+            </a:r>
+            <a:endParaRPr lang="en-US" dirty="0"/>
+          </a:p>
+        </p:txBody>
+      </p:sp>
+      <p:pic>
+        <p:nvPicPr>
+          <p:cNvPr id="4099" name="Picture 3"/>
+          <p:cNvPicPr>
+            <a:picLocks noChangeAspect="1" noChangeArrowheads="1"/>
+          </p:cNvPicPr>
+          <p:nvPr/>
+        </p:nvPicPr>
+        <p:blipFill>
+          <a:blip r:embed="rId3">
+            <a:extLst>
+              <a:ext uri="{28A0092B-C50C-407E-A947-70E740481C1C}">
+                <a14:useLocalDpi xmlns:a14="http://schemas.microsoft.com/office/drawing/2010/main" val="0"/>
+              </a:ext>
+            </a:extLst>
+          </a:blip>
+          <a:srcRect/>
+          <a:stretch>
+            <a:fillRect/>
+          </a:stretch>
+        </p:blipFill>
+        <p:spPr bwMode="auto">
+          <a:xfrm>
+            <a:off x="476249" y="1509712"/>
+            <a:ext cx="4095749" cy="3776223"/>
+          </a:xfrm>
+          <a:prstGeom prst="rect">
+            <a:avLst/>
+          </a:prstGeom>
+          <a:noFill/>
+          <a:ln>
+            <a:noFill/>
+          </a:ln>
+          <a:extLst>
+            <a:ext uri="{909E8E84-426E-40DD-AFC4-6F175D3DCCD1}">
+              <a14:hiddenFill xmlns:a14="http://schemas.microsoft.com/office/drawing/2010/main">
+                <a:solidFill>
+                  <a:schemeClr val="accent1"/>
+                </a:solidFill>
+              </a14:hiddenFill>
+            </a:ext>
+            <a:ext uri="{91240B29-F687-4F45-9708-019B960494DF}">
+              <a14:hiddenLine xmlns:a14="http://schemas.microsoft.com/office/drawing/2010/main" w="9525">
+                <a:solidFill>
+                  <a:schemeClr val="tx1"/>
+                </a:solidFill>
+                <a:miter lim="800000"/>
+                <a:headEnd/>
+                <a:tailEnd/>
+              </a14:hiddenLine>
+            </a:ext>
+          </a:extLst>
+        </p:spPr>
+      </p:pic>
+    </p:spTree>
+    <p:extLst>
+      <p:ext uri="{BB962C8B-B14F-4D97-AF65-F5344CB8AC3E}">
+        <p14:creationId xmlns:p14="http://schemas.microsoft.com/office/powerpoint/2010/main" val="819379470"/>
+      </p:ext>
+    </p:extLst>
+  </p:cSld>
+  <p:clrMapOvr>
+    <a:masterClrMapping/>
+  </p:clrMapOvr>
+  <p:timing>
+    <p:tnLst>
+      <p:par>
+        <p:cTn id="1" dur="indefinite" restart="never" nodeType="tmRoot"/>
+      </p:par>
+    </p:tnLst>
+  </p:timing>
 </p:sld>
 </file>
 

</xml_diff>